<commit_message>
add logo at nav, add faq
</commit_message>
<xml_diff>
--- a/des.pptx
+++ b/des.pptx
@@ -2,20 +2,20 @@
 <file path=ppt/presentation.xml><?xml version="1.0" encoding="utf-8"?>
 <p:presentation xmlns:a="http://schemas.openxmlformats.org/drawingml/2006/main" xmlns:r="http://schemas.openxmlformats.org/officeDocument/2006/relationships" xmlns:p="http://schemas.openxmlformats.org/presentationml/2006/main" saveSubsetFonts="1">
   <p:sldMasterIdLst>
-    <p:sldMasterId id="2147483648" r:id="rId1"/>
+    <p:sldMasterId id="2147483660" r:id="rId1"/>
   </p:sldMasterIdLst>
   <p:sldIdLst>
     <p:sldId id="256" r:id="rId2"/>
-    <p:sldId id="257" r:id="rId3"/>
-    <p:sldId id="258" r:id="rId4"/>
+    <p:sldId id="258" r:id="rId3"/>
+    <p:sldId id="257" r:id="rId4"/>
   </p:sldIdLst>
-  <p:sldSz cx="12192000" cy="6858000"/>
+  <p:sldSz cx="35999738" cy="18000663"/>
   <p:notesSz cx="6858000" cy="9144000"/>
   <p:defaultTextStyle>
     <a:defPPr>
       <a:defRPr lang="en-US"/>
     </a:defPPr>
-    <a:lvl1pPr marL="0" algn="l" defTabSz="914400" rtl="0" eaLnBrk="1" latinLnBrk="0" hangingPunct="1">
+    <a:lvl1pPr marL="0" algn="l" defTabSz="457200" rtl="0" eaLnBrk="1" latinLnBrk="0" hangingPunct="1">
       <a:defRPr sz="1800" kern="1200">
         <a:solidFill>
           <a:schemeClr val="tx1"/>
@@ -25,7 +25,7 @@
         <a:cs typeface="+mn-cs"/>
       </a:defRPr>
     </a:lvl1pPr>
-    <a:lvl2pPr marL="457200" algn="l" defTabSz="914400" rtl="0" eaLnBrk="1" latinLnBrk="0" hangingPunct="1">
+    <a:lvl2pPr marL="457200" algn="l" defTabSz="457200" rtl="0" eaLnBrk="1" latinLnBrk="0" hangingPunct="1">
       <a:defRPr sz="1800" kern="1200">
         <a:solidFill>
           <a:schemeClr val="tx1"/>
@@ -35,7 +35,7 @@
         <a:cs typeface="+mn-cs"/>
       </a:defRPr>
     </a:lvl2pPr>
-    <a:lvl3pPr marL="914400" algn="l" defTabSz="914400" rtl="0" eaLnBrk="1" latinLnBrk="0" hangingPunct="1">
+    <a:lvl3pPr marL="914400" algn="l" defTabSz="457200" rtl="0" eaLnBrk="1" latinLnBrk="0" hangingPunct="1">
       <a:defRPr sz="1800" kern="1200">
         <a:solidFill>
           <a:schemeClr val="tx1"/>
@@ -45,7 +45,7 @@
         <a:cs typeface="+mn-cs"/>
       </a:defRPr>
     </a:lvl3pPr>
-    <a:lvl4pPr marL="1371600" algn="l" defTabSz="914400" rtl="0" eaLnBrk="1" latinLnBrk="0" hangingPunct="1">
+    <a:lvl4pPr marL="1371600" algn="l" defTabSz="457200" rtl="0" eaLnBrk="1" latinLnBrk="0" hangingPunct="1">
       <a:defRPr sz="1800" kern="1200">
         <a:solidFill>
           <a:schemeClr val="tx1"/>
@@ -55,7 +55,7 @@
         <a:cs typeface="+mn-cs"/>
       </a:defRPr>
     </a:lvl4pPr>
-    <a:lvl5pPr marL="1828800" algn="l" defTabSz="914400" rtl="0" eaLnBrk="1" latinLnBrk="0" hangingPunct="1">
+    <a:lvl5pPr marL="1828800" algn="l" defTabSz="457200" rtl="0" eaLnBrk="1" latinLnBrk="0" hangingPunct="1">
       <a:defRPr sz="1800" kern="1200">
         <a:solidFill>
           <a:schemeClr val="tx1"/>
@@ -65,7 +65,7 @@
         <a:cs typeface="+mn-cs"/>
       </a:defRPr>
     </a:lvl5pPr>
-    <a:lvl6pPr marL="2286000" algn="l" defTabSz="914400" rtl="0" eaLnBrk="1" latinLnBrk="0" hangingPunct="1">
+    <a:lvl6pPr marL="2286000" algn="l" defTabSz="457200" rtl="0" eaLnBrk="1" latinLnBrk="0" hangingPunct="1">
       <a:defRPr sz="1800" kern="1200">
         <a:solidFill>
           <a:schemeClr val="tx1"/>
@@ -75,7 +75,7 @@
         <a:cs typeface="+mn-cs"/>
       </a:defRPr>
     </a:lvl6pPr>
-    <a:lvl7pPr marL="2743200" algn="l" defTabSz="914400" rtl="0" eaLnBrk="1" latinLnBrk="0" hangingPunct="1">
+    <a:lvl7pPr marL="2743200" algn="l" defTabSz="457200" rtl="0" eaLnBrk="1" latinLnBrk="0" hangingPunct="1">
       <a:defRPr sz="1800" kern="1200">
         <a:solidFill>
           <a:schemeClr val="tx1"/>
@@ -85,7 +85,7 @@
         <a:cs typeface="+mn-cs"/>
       </a:defRPr>
     </a:lvl7pPr>
-    <a:lvl8pPr marL="3200400" algn="l" defTabSz="914400" rtl="0" eaLnBrk="1" latinLnBrk="0" hangingPunct="1">
+    <a:lvl8pPr marL="3200400" algn="l" defTabSz="457200" rtl="0" eaLnBrk="1" latinLnBrk="0" hangingPunct="1">
       <a:defRPr sz="1800" kern="1200">
         <a:solidFill>
           <a:schemeClr val="tx1"/>
@@ -95,7 +95,7 @@
         <a:cs typeface="+mn-cs"/>
       </a:defRPr>
     </a:lvl8pPr>
-    <a:lvl9pPr marL="3657600" algn="l" defTabSz="914400" rtl="0" eaLnBrk="1" latinLnBrk="0" hangingPunct="1">
+    <a:lvl9pPr marL="3657600" algn="l" defTabSz="457200" rtl="0" eaLnBrk="1" latinLnBrk="0" hangingPunct="1">
       <a:defRPr sz="1800" kern="1200">
         <a:solidFill>
           <a:schemeClr val="tx1"/>
@@ -133,13 +133,7 @@
       </p:grpSpPr>
       <p:sp>
         <p:nvSpPr>
-          <p:cNvPr id="2" name="Title 1">
-            <a:extLst>
-              <a:ext uri="{FF2B5EF4-FFF2-40B4-BE49-F238E27FC236}">
-                <a16:creationId xmlns:a16="http://schemas.microsoft.com/office/drawing/2014/main" id="{AF8FFED8-B2CE-460F-96D6-6BEFDCB60CEE}"/>
-              </a:ext>
-            </a:extLst>
-          </p:cNvPr>
+          <p:cNvPr id="2" name="Title 1"/>
           <p:cNvSpPr>
             <a:spLocks noGrp="1"/>
           </p:cNvSpPr>
@@ -149,15 +143,15 @@
         </p:nvSpPr>
         <p:spPr>
           <a:xfrm>
-            <a:off x="1524000" y="1122363"/>
-            <a:ext cx="9144000" cy="2387600"/>
+            <a:off x="4499967" y="2945943"/>
+            <a:ext cx="26999804" cy="6266897"/>
           </a:xfrm>
         </p:spPr>
         <p:txBody>
           <a:bodyPr anchor="b"/>
           <a:lstStyle>
             <a:lvl1pPr algn="ctr">
-              <a:defRPr sz="6000"/>
+              <a:defRPr sz="15749"/>
             </a:lvl1pPr>
           </a:lstStyle>
           <a:p>
@@ -165,18 +159,13 @@
               <a:rPr lang="en-US"/>
               <a:t>Click to edit Master title style</a:t>
             </a:r>
-          </a:p>
-        </p:txBody>
-      </p:sp>
-      <p:sp>
-        <p:nvSpPr>
-          <p:cNvPr id="3" name="Subtitle 2">
-            <a:extLst>
-              <a:ext uri="{FF2B5EF4-FFF2-40B4-BE49-F238E27FC236}">
-                <a16:creationId xmlns:a16="http://schemas.microsoft.com/office/drawing/2014/main" id="{29A98A78-4EF9-4049-A675-90865728B074}"/>
-              </a:ext>
-            </a:extLst>
-          </p:cNvPr>
+            <a:endParaRPr lang="en-US" dirty="0"/>
+          </a:p>
+        </p:txBody>
+      </p:sp>
+      <p:sp>
+        <p:nvSpPr>
+          <p:cNvPr id="3" name="Subtitle 2"/>
           <p:cNvSpPr>
             <a:spLocks noGrp="1"/>
           </p:cNvSpPr>
@@ -186,8 +175,8 @@
         </p:nvSpPr>
         <p:spPr>
           <a:xfrm>
-            <a:off x="1524000" y="3602038"/>
-            <a:ext cx="9144000" cy="1655762"/>
+            <a:off x="4499967" y="9454516"/>
+            <a:ext cx="26999804" cy="4345992"/>
           </a:xfrm>
         </p:spPr>
         <p:txBody>
@@ -195,39 +184,39 @@
           <a:lstStyle>
             <a:lvl1pPr marL="0" indent="0" algn="ctr">
               <a:buNone/>
-              <a:defRPr sz="2400"/>
+              <a:defRPr sz="6300"/>
             </a:lvl1pPr>
-            <a:lvl2pPr marL="457200" indent="0" algn="ctr">
-              <a:buNone/>
-              <a:defRPr sz="2000"/>
+            <a:lvl2pPr marL="1200059" indent="0" algn="ctr">
+              <a:buNone/>
+              <a:defRPr sz="5250"/>
             </a:lvl2pPr>
-            <a:lvl3pPr marL="914400" indent="0" algn="ctr">
-              <a:buNone/>
-              <a:defRPr sz="1800"/>
+            <a:lvl3pPr marL="2400117" indent="0" algn="ctr">
+              <a:buNone/>
+              <a:defRPr sz="4725"/>
             </a:lvl3pPr>
-            <a:lvl4pPr marL="1371600" indent="0" algn="ctr">
-              <a:buNone/>
-              <a:defRPr sz="1600"/>
+            <a:lvl4pPr marL="3600176" indent="0" algn="ctr">
+              <a:buNone/>
+              <a:defRPr sz="4200"/>
             </a:lvl4pPr>
-            <a:lvl5pPr marL="1828800" indent="0" algn="ctr">
-              <a:buNone/>
-              <a:defRPr sz="1600"/>
+            <a:lvl5pPr marL="4800234" indent="0" algn="ctr">
+              <a:buNone/>
+              <a:defRPr sz="4200"/>
             </a:lvl5pPr>
-            <a:lvl6pPr marL="2286000" indent="0" algn="ctr">
-              <a:buNone/>
-              <a:defRPr sz="1600"/>
+            <a:lvl6pPr marL="6000293" indent="0" algn="ctr">
+              <a:buNone/>
+              <a:defRPr sz="4200"/>
             </a:lvl6pPr>
-            <a:lvl7pPr marL="2743200" indent="0" algn="ctr">
-              <a:buNone/>
-              <a:defRPr sz="1600"/>
+            <a:lvl7pPr marL="7200351" indent="0" algn="ctr">
+              <a:buNone/>
+              <a:defRPr sz="4200"/>
             </a:lvl7pPr>
-            <a:lvl8pPr marL="3200400" indent="0" algn="ctr">
-              <a:buNone/>
-              <a:defRPr sz="1600"/>
+            <a:lvl8pPr marL="8400410" indent="0" algn="ctr">
+              <a:buNone/>
+              <a:defRPr sz="4200"/>
             </a:lvl8pPr>
-            <a:lvl9pPr marL="3657600" indent="0" algn="ctr">
-              <a:buNone/>
-              <a:defRPr sz="1600"/>
+            <a:lvl9pPr marL="9600468" indent="0" algn="ctr">
+              <a:buNone/>
+              <a:defRPr sz="4200"/>
             </a:lvl9pPr>
           </a:lstStyle>
           <a:p>
@@ -235,18 +224,13 @@
               <a:rPr lang="en-US"/>
               <a:t>Click to edit Master subtitle style</a:t>
             </a:r>
-          </a:p>
-        </p:txBody>
-      </p:sp>
-      <p:sp>
-        <p:nvSpPr>
-          <p:cNvPr id="4" name="Date Placeholder 3">
-            <a:extLst>
-              <a:ext uri="{FF2B5EF4-FFF2-40B4-BE49-F238E27FC236}">
-                <a16:creationId xmlns:a16="http://schemas.microsoft.com/office/drawing/2014/main" id="{CD84C3C6-01AB-4AF5-B2FD-020BD8016236}"/>
-              </a:ext>
-            </a:extLst>
-          </p:cNvPr>
+            <a:endParaRPr lang="en-US" dirty="0"/>
+          </a:p>
+        </p:txBody>
+      </p:sp>
+      <p:sp>
+        <p:nvSpPr>
+          <p:cNvPr id="4" name="Date Placeholder 3"/>
           <p:cNvSpPr>
             <a:spLocks noGrp="1"/>
           </p:cNvSpPr>
@@ -261,7 +245,7 @@
           <a:p>
             <a:fld id="{76ABEC16-1E1A-40CE-AB5F-E22D57C0F079}" type="datetimeFigureOut">
               <a:rPr lang="en-US" smtClean="0"/>
-              <a:t>9/3/2021</a:t>
+              <a:t>9/7/2021</a:t>
             </a:fld>
             <a:endParaRPr lang="en-US"/>
           </a:p>
@@ -269,13 +253,7 @@
       </p:sp>
       <p:sp>
         <p:nvSpPr>
-          <p:cNvPr id="5" name="Footer Placeholder 4">
-            <a:extLst>
-              <a:ext uri="{FF2B5EF4-FFF2-40B4-BE49-F238E27FC236}">
-                <a16:creationId xmlns:a16="http://schemas.microsoft.com/office/drawing/2014/main" id="{F123F30C-AEDA-4FAF-86A1-EB82D6E677B7}"/>
-              </a:ext>
-            </a:extLst>
-          </p:cNvPr>
+          <p:cNvPr id="5" name="Footer Placeholder 4"/>
           <p:cNvSpPr>
             <a:spLocks noGrp="1"/>
           </p:cNvSpPr>
@@ -294,13 +272,7 @@
       </p:sp>
       <p:sp>
         <p:nvSpPr>
-          <p:cNvPr id="6" name="Slide Number Placeholder 5">
-            <a:extLst>
-              <a:ext uri="{FF2B5EF4-FFF2-40B4-BE49-F238E27FC236}">
-                <a16:creationId xmlns:a16="http://schemas.microsoft.com/office/drawing/2014/main" id="{7CE5FF26-11AB-4BCE-AE50-89BE87ACD948}"/>
-              </a:ext>
-            </a:extLst>
-          </p:cNvPr>
+          <p:cNvPr id="6" name="Slide Number Placeholder 5"/>
           <p:cNvSpPr>
             <a:spLocks noGrp="1"/>
           </p:cNvSpPr>
@@ -324,7 +296,7 @@
     </p:spTree>
     <p:extLst>
       <p:ext uri="{BB962C8B-B14F-4D97-AF65-F5344CB8AC3E}">
-        <p14:creationId xmlns:p14="http://schemas.microsoft.com/office/powerpoint/2010/main" val="2123184577"/>
+        <p14:creationId xmlns:p14="http://schemas.microsoft.com/office/powerpoint/2010/main" val="4276038532"/>
       </p:ext>
     </p:extLst>
   </p:cSld>
@@ -353,13 +325,7 @@
       </p:grpSpPr>
       <p:sp>
         <p:nvSpPr>
-          <p:cNvPr id="2" name="Title 1">
-            <a:extLst>
-              <a:ext uri="{FF2B5EF4-FFF2-40B4-BE49-F238E27FC236}">
-                <a16:creationId xmlns:a16="http://schemas.microsoft.com/office/drawing/2014/main" id="{7D8587D3-A781-45A5-807A-839AA1832A93}"/>
-              </a:ext>
-            </a:extLst>
-          </p:cNvPr>
+          <p:cNvPr id="2" name="Title 1"/>
           <p:cNvSpPr>
             <a:spLocks noGrp="1"/>
           </p:cNvSpPr>
@@ -376,18 +342,13 @@
               <a:rPr lang="en-US"/>
               <a:t>Click to edit Master title style</a:t>
             </a:r>
-          </a:p>
-        </p:txBody>
-      </p:sp>
-      <p:sp>
-        <p:nvSpPr>
-          <p:cNvPr id="3" name="Vertical Text Placeholder 2">
-            <a:extLst>
-              <a:ext uri="{FF2B5EF4-FFF2-40B4-BE49-F238E27FC236}">
-                <a16:creationId xmlns:a16="http://schemas.microsoft.com/office/drawing/2014/main" id="{7E148576-C27E-42EA-ABF2-A0DDC72D175E}"/>
-              </a:ext>
-            </a:extLst>
-          </p:cNvPr>
+            <a:endParaRPr lang="en-US" dirty="0"/>
+          </a:p>
+        </p:txBody>
+      </p:sp>
+      <p:sp>
+        <p:nvSpPr>
+          <p:cNvPr id="3" name="Vertical Text Placeholder 2"/>
           <p:cNvSpPr>
             <a:spLocks noGrp="1"/>
           </p:cNvSpPr>
@@ -433,18 +394,13 @@
               <a:rPr lang="en-US"/>
               <a:t>Fifth level</a:t>
             </a:r>
-          </a:p>
-        </p:txBody>
-      </p:sp>
-      <p:sp>
-        <p:nvSpPr>
-          <p:cNvPr id="4" name="Date Placeholder 3">
-            <a:extLst>
-              <a:ext uri="{FF2B5EF4-FFF2-40B4-BE49-F238E27FC236}">
-                <a16:creationId xmlns:a16="http://schemas.microsoft.com/office/drawing/2014/main" id="{97220850-2331-4806-8F8B-E44967E77AAF}"/>
-              </a:ext>
-            </a:extLst>
-          </p:cNvPr>
+            <a:endParaRPr lang="en-US" dirty="0"/>
+          </a:p>
+        </p:txBody>
+      </p:sp>
+      <p:sp>
+        <p:nvSpPr>
+          <p:cNvPr id="4" name="Date Placeholder 3"/>
           <p:cNvSpPr>
             <a:spLocks noGrp="1"/>
           </p:cNvSpPr>
@@ -459,7 +415,7 @@
           <a:p>
             <a:fld id="{76ABEC16-1E1A-40CE-AB5F-E22D57C0F079}" type="datetimeFigureOut">
               <a:rPr lang="en-US" smtClean="0"/>
-              <a:t>9/3/2021</a:t>
+              <a:t>9/7/2021</a:t>
             </a:fld>
             <a:endParaRPr lang="en-US"/>
           </a:p>
@@ -467,13 +423,7 @@
       </p:sp>
       <p:sp>
         <p:nvSpPr>
-          <p:cNvPr id="5" name="Footer Placeholder 4">
-            <a:extLst>
-              <a:ext uri="{FF2B5EF4-FFF2-40B4-BE49-F238E27FC236}">
-                <a16:creationId xmlns:a16="http://schemas.microsoft.com/office/drawing/2014/main" id="{16C30A83-0AF5-47E3-9427-577019714F87}"/>
-              </a:ext>
-            </a:extLst>
-          </p:cNvPr>
+          <p:cNvPr id="5" name="Footer Placeholder 4"/>
           <p:cNvSpPr>
             <a:spLocks noGrp="1"/>
           </p:cNvSpPr>
@@ -492,13 +442,7 @@
       </p:sp>
       <p:sp>
         <p:nvSpPr>
-          <p:cNvPr id="6" name="Slide Number Placeholder 5">
-            <a:extLst>
-              <a:ext uri="{FF2B5EF4-FFF2-40B4-BE49-F238E27FC236}">
-                <a16:creationId xmlns:a16="http://schemas.microsoft.com/office/drawing/2014/main" id="{5C81F716-3F0F-4840-ABD0-5E65D6B7A444}"/>
-              </a:ext>
-            </a:extLst>
-          </p:cNvPr>
+          <p:cNvPr id="6" name="Slide Number Placeholder 5"/>
           <p:cNvSpPr>
             <a:spLocks noGrp="1"/>
           </p:cNvSpPr>
@@ -522,7 +466,7 @@
     </p:spTree>
     <p:extLst>
       <p:ext uri="{BB962C8B-B14F-4D97-AF65-F5344CB8AC3E}">
-        <p14:creationId xmlns:p14="http://schemas.microsoft.com/office/powerpoint/2010/main" val="2787471898"/>
+        <p14:creationId xmlns:p14="http://schemas.microsoft.com/office/powerpoint/2010/main" val="2877475072"/>
       </p:ext>
     </p:extLst>
   </p:cSld>
@@ -551,13 +495,7 @@
       </p:grpSpPr>
       <p:sp>
         <p:nvSpPr>
-          <p:cNvPr id="2" name="Vertical Title 1">
-            <a:extLst>
-              <a:ext uri="{FF2B5EF4-FFF2-40B4-BE49-F238E27FC236}">
-                <a16:creationId xmlns:a16="http://schemas.microsoft.com/office/drawing/2014/main" id="{C9234DF9-0AD3-4331-8469-F0B9713A4C2D}"/>
-              </a:ext>
-            </a:extLst>
-          </p:cNvPr>
+          <p:cNvPr id="2" name="Vertical Title 1"/>
           <p:cNvSpPr>
             <a:spLocks noGrp="1"/>
           </p:cNvSpPr>
@@ -567,8 +505,8 @@
         </p:nvSpPr>
         <p:spPr>
           <a:xfrm>
-            <a:off x="8724900" y="365125"/>
-            <a:ext cx="2628900" cy="5811838"/>
+            <a:off x="25762312" y="958369"/>
+            <a:ext cx="7762444" cy="15254730"/>
           </a:xfrm>
         </p:spPr>
         <p:txBody>
@@ -579,18 +517,13 @@
               <a:rPr lang="en-US"/>
               <a:t>Click to edit Master title style</a:t>
             </a:r>
-          </a:p>
-        </p:txBody>
-      </p:sp>
-      <p:sp>
-        <p:nvSpPr>
-          <p:cNvPr id="3" name="Vertical Text Placeholder 2">
-            <a:extLst>
-              <a:ext uri="{FF2B5EF4-FFF2-40B4-BE49-F238E27FC236}">
-                <a16:creationId xmlns:a16="http://schemas.microsoft.com/office/drawing/2014/main" id="{CBF43765-D8D7-49FF-8818-761007CCBFCB}"/>
-              </a:ext>
-            </a:extLst>
-          </p:cNvPr>
+            <a:endParaRPr lang="en-US" dirty="0"/>
+          </a:p>
+        </p:txBody>
+      </p:sp>
+      <p:sp>
+        <p:nvSpPr>
+          <p:cNvPr id="3" name="Vertical Text Placeholder 2"/>
           <p:cNvSpPr>
             <a:spLocks noGrp="1"/>
           </p:cNvSpPr>
@@ -600,8 +533,8 @@
         </p:nvSpPr>
         <p:spPr>
           <a:xfrm>
-            <a:off x="838200" y="365125"/>
-            <a:ext cx="7734300" cy="5811838"/>
+            <a:off x="2474982" y="958369"/>
+            <a:ext cx="22837334" cy="15254730"/>
           </a:xfrm>
         </p:spPr>
         <p:txBody>
@@ -641,18 +574,13 @@
               <a:rPr lang="en-US"/>
               <a:t>Fifth level</a:t>
             </a:r>
-          </a:p>
-        </p:txBody>
-      </p:sp>
-      <p:sp>
-        <p:nvSpPr>
-          <p:cNvPr id="4" name="Date Placeholder 3">
-            <a:extLst>
-              <a:ext uri="{FF2B5EF4-FFF2-40B4-BE49-F238E27FC236}">
-                <a16:creationId xmlns:a16="http://schemas.microsoft.com/office/drawing/2014/main" id="{EB549AB5-1131-40D1-8C5D-FFBC7101B24E}"/>
-              </a:ext>
-            </a:extLst>
-          </p:cNvPr>
+            <a:endParaRPr lang="en-US" dirty="0"/>
+          </a:p>
+        </p:txBody>
+      </p:sp>
+      <p:sp>
+        <p:nvSpPr>
+          <p:cNvPr id="4" name="Date Placeholder 3"/>
           <p:cNvSpPr>
             <a:spLocks noGrp="1"/>
           </p:cNvSpPr>
@@ -667,7 +595,7 @@
           <a:p>
             <a:fld id="{76ABEC16-1E1A-40CE-AB5F-E22D57C0F079}" type="datetimeFigureOut">
               <a:rPr lang="en-US" smtClean="0"/>
-              <a:t>9/3/2021</a:t>
+              <a:t>9/7/2021</a:t>
             </a:fld>
             <a:endParaRPr lang="en-US"/>
           </a:p>
@@ -675,13 +603,7 @@
       </p:sp>
       <p:sp>
         <p:nvSpPr>
-          <p:cNvPr id="5" name="Footer Placeholder 4">
-            <a:extLst>
-              <a:ext uri="{FF2B5EF4-FFF2-40B4-BE49-F238E27FC236}">
-                <a16:creationId xmlns:a16="http://schemas.microsoft.com/office/drawing/2014/main" id="{F440DBD3-6DBF-445F-847A-5EE113F73E6E}"/>
-              </a:ext>
-            </a:extLst>
-          </p:cNvPr>
+          <p:cNvPr id="5" name="Footer Placeholder 4"/>
           <p:cNvSpPr>
             <a:spLocks noGrp="1"/>
           </p:cNvSpPr>
@@ -700,13 +622,7 @@
       </p:sp>
       <p:sp>
         <p:nvSpPr>
-          <p:cNvPr id="6" name="Slide Number Placeholder 5">
-            <a:extLst>
-              <a:ext uri="{FF2B5EF4-FFF2-40B4-BE49-F238E27FC236}">
-                <a16:creationId xmlns:a16="http://schemas.microsoft.com/office/drawing/2014/main" id="{C3B34830-496B-4015-A793-38DD5DD65454}"/>
-              </a:ext>
-            </a:extLst>
-          </p:cNvPr>
+          <p:cNvPr id="6" name="Slide Number Placeholder 5"/>
           <p:cNvSpPr>
             <a:spLocks noGrp="1"/>
           </p:cNvSpPr>
@@ -730,7 +646,7 @@
     </p:spTree>
     <p:extLst>
       <p:ext uri="{BB962C8B-B14F-4D97-AF65-F5344CB8AC3E}">
-        <p14:creationId xmlns:p14="http://schemas.microsoft.com/office/powerpoint/2010/main" val="666232237"/>
+        <p14:creationId xmlns:p14="http://schemas.microsoft.com/office/powerpoint/2010/main" val="2899985214"/>
       </p:ext>
     </p:extLst>
   </p:cSld>
@@ -759,13 +675,7 @@
       </p:grpSpPr>
       <p:sp>
         <p:nvSpPr>
-          <p:cNvPr id="2" name="Title 1">
-            <a:extLst>
-              <a:ext uri="{FF2B5EF4-FFF2-40B4-BE49-F238E27FC236}">
-                <a16:creationId xmlns:a16="http://schemas.microsoft.com/office/drawing/2014/main" id="{876435DF-BD12-4ECD-82F1-F05EC0CE356F}"/>
-              </a:ext>
-            </a:extLst>
-          </p:cNvPr>
+          <p:cNvPr id="2" name="Title 1"/>
           <p:cNvSpPr>
             <a:spLocks noGrp="1"/>
           </p:cNvSpPr>
@@ -782,18 +692,13 @@
               <a:rPr lang="en-US"/>
               <a:t>Click to edit Master title style</a:t>
             </a:r>
-          </a:p>
-        </p:txBody>
-      </p:sp>
-      <p:sp>
-        <p:nvSpPr>
-          <p:cNvPr id="3" name="Content Placeholder 2">
-            <a:extLst>
-              <a:ext uri="{FF2B5EF4-FFF2-40B4-BE49-F238E27FC236}">
-                <a16:creationId xmlns:a16="http://schemas.microsoft.com/office/drawing/2014/main" id="{9CB987BB-5C56-4C28-ABFC-5BBB7B0CE76D}"/>
-              </a:ext>
-            </a:extLst>
-          </p:cNvPr>
+            <a:endParaRPr lang="en-US" dirty="0"/>
+          </a:p>
+        </p:txBody>
+      </p:sp>
+      <p:sp>
+        <p:nvSpPr>
+          <p:cNvPr id="3" name="Content Placeholder 2"/>
           <p:cNvSpPr>
             <a:spLocks noGrp="1"/>
           </p:cNvSpPr>
@@ -839,18 +744,13 @@
               <a:rPr lang="en-US"/>
               <a:t>Fifth level</a:t>
             </a:r>
-          </a:p>
-        </p:txBody>
-      </p:sp>
-      <p:sp>
-        <p:nvSpPr>
-          <p:cNvPr id="4" name="Date Placeholder 3">
-            <a:extLst>
-              <a:ext uri="{FF2B5EF4-FFF2-40B4-BE49-F238E27FC236}">
-                <a16:creationId xmlns:a16="http://schemas.microsoft.com/office/drawing/2014/main" id="{574149FB-6A28-4B8A-BC4E-348B024523A1}"/>
-              </a:ext>
-            </a:extLst>
-          </p:cNvPr>
+            <a:endParaRPr lang="en-US" dirty="0"/>
+          </a:p>
+        </p:txBody>
+      </p:sp>
+      <p:sp>
+        <p:nvSpPr>
+          <p:cNvPr id="4" name="Date Placeholder 3"/>
           <p:cNvSpPr>
             <a:spLocks noGrp="1"/>
           </p:cNvSpPr>
@@ -865,7 +765,7 @@
           <a:p>
             <a:fld id="{76ABEC16-1E1A-40CE-AB5F-E22D57C0F079}" type="datetimeFigureOut">
               <a:rPr lang="en-US" smtClean="0"/>
-              <a:t>9/3/2021</a:t>
+              <a:t>9/7/2021</a:t>
             </a:fld>
             <a:endParaRPr lang="en-US"/>
           </a:p>
@@ -873,13 +773,7 @@
       </p:sp>
       <p:sp>
         <p:nvSpPr>
-          <p:cNvPr id="5" name="Footer Placeholder 4">
-            <a:extLst>
-              <a:ext uri="{FF2B5EF4-FFF2-40B4-BE49-F238E27FC236}">
-                <a16:creationId xmlns:a16="http://schemas.microsoft.com/office/drawing/2014/main" id="{A3F986F6-B4AD-4C2E-BD5A-F24A3C18E5FA}"/>
-              </a:ext>
-            </a:extLst>
-          </p:cNvPr>
+          <p:cNvPr id="5" name="Footer Placeholder 4"/>
           <p:cNvSpPr>
             <a:spLocks noGrp="1"/>
           </p:cNvSpPr>
@@ -898,13 +792,7 @@
       </p:sp>
       <p:sp>
         <p:nvSpPr>
-          <p:cNvPr id="6" name="Slide Number Placeholder 5">
-            <a:extLst>
-              <a:ext uri="{FF2B5EF4-FFF2-40B4-BE49-F238E27FC236}">
-                <a16:creationId xmlns:a16="http://schemas.microsoft.com/office/drawing/2014/main" id="{8C789DF0-4BE9-4141-A250-E7DBDCFC6325}"/>
-              </a:ext>
-            </a:extLst>
-          </p:cNvPr>
+          <p:cNvPr id="6" name="Slide Number Placeholder 5"/>
           <p:cNvSpPr>
             <a:spLocks noGrp="1"/>
           </p:cNvSpPr>
@@ -928,7 +816,7 @@
     </p:spTree>
     <p:extLst>
       <p:ext uri="{BB962C8B-B14F-4D97-AF65-F5344CB8AC3E}">
-        <p14:creationId xmlns:p14="http://schemas.microsoft.com/office/powerpoint/2010/main" val="920699363"/>
+        <p14:creationId xmlns:p14="http://schemas.microsoft.com/office/powerpoint/2010/main" val="3397125317"/>
       </p:ext>
     </p:extLst>
   </p:cSld>
@@ -957,13 +845,7 @@
       </p:grpSpPr>
       <p:sp>
         <p:nvSpPr>
-          <p:cNvPr id="2" name="Title 1">
-            <a:extLst>
-              <a:ext uri="{FF2B5EF4-FFF2-40B4-BE49-F238E27FC236}">
-                <a16:creationId xmlns:a16="http://schemas.microsoft.com/office/drawing/2014/main" id="{6FC14B9D-A390-4F16-A444-2DA54302997F}"/>
-              </a:ext>
-            </a:extLst>
-          </p:cNvPr>
+          <p:cNvPr id="2" name="Title 1"/>
           <p:cNvSpPr>
             <a:spLocks noGrp="1"/>
           </p:cNvSpPr>
@@ -973,15 +855,15 @@
         </p:nvSpPr>
         <p:spPr>
           <a:xfrm>
-            <a:off x="831850" y="1709738"/>
-            <a:ext cx="10515600" cy="2852737"/>
+            <a:off x="2456232" y="4487668"/>
+            <a:ext cx="31049774" cy="7487774"/>
           </a:xfrm>
         </p:spPr>
         <p:txBody>
           <a:bodyPr anchor="b"/>
           <a:lstStyle>
             <a:lvl1pPr>
-              <a:defRPr sz="6000"/>
+              <a:defRPr sz="15749"/>
             </a:lvl1pPr>
           </a:lstStyle>
           <a:p>
@@ -989,18 +871,13 @@
               <a:rPr lang="en-US"/>
               <a:t>Click to edit Master title style</a:t>
             </a:r>
-          </a:p>
-        </p:txBody>
-      </p:sp>
-      <p:sp>
-        <p:nvSpPr>
-          <p:cNvPr id="3" name="Text Placeholder 2">
-            <a:extLst>
-              <a:ext uri="{FF2B5EF4-FFF2-40B4-BE49-F238E27FC236}">
-                <a16:creationId xmlns:a16="http://schemas.microsoft.com/office/drawing/2014/main" id="{27A1593F-B6B7-4C4B-A5BA-1D2183520B44}"/>
-              </a:ext>
-            </a:extLst>
-          </p:cNvPr>
+            <a:endParaRPr lang="en-US" dirty="0"/>
+          </a:p>
+        </p:txBody>
+      </p:sp>
+      <p:sp>
+        <p:nvSpPr>
+          <p:cNvPr id="3" name="Text Placeholder 2"/>
           <p:cNvSpPr>
             <a:spLocks noGrp="1"/>
           </p:cNvSpPr>
@@ -1010,8 +887,8 @@
         </p:nvSpPr>
         <p:spPr>
           <a:xfrm>
-            <a:off x="831850" y="4589463"/>
-            <a:ext cx="10515600" cy="1500187"/>
+            <a:off x="2456232" y="12046280"/>
+            <a:ext cx="31049774" cy="3937644"/>
           </a:xfrm>
         </p:spPr>
         <p:txBody>
@@ -1019,7 +896,7 @@
           <a:lstStyle>
             <a:lvl1pPr marL="0" indent="0">
               <a:buNone/>
-              <a:defRPr sz="2400">
+              <a:defRPr sz="6300">
                 <a:solidFill>
                   <a:schemeClr val="tx1">
                     <a:tint val="75000"/>
@@ -1027,9 +904,9 @@
                 </a:solidFill>
               </a:defRPr>
             </a:lvl1pPr>
-            <a:lvl2pPr marL="457200" indent="0">
-              <a:buNone/>
-              <a:defRPr sz="2000">
+            <a:lvl2pPr marL="1200059" indent="0">
+              <a:buNone/>
+              <a:defRPr sz="5250">
                 <a:solidFill>
                   <a:schemeClr val="tx1">
                     <a:tint val="75000"/>
@@ -1037,9 +914,9 @@
                 </a:solidFill>
               </a:defRPr>
             </a:lvl2pPr>
-            <a:lvl3pPr marL="914400" indent="0">
-              <a:buNone/>
-              <a:defRPr sz="1800">
+            <a:lvl3pPr marL="2400117" indent="0">
+              <a:buNone/>
+              <a:defRPr sz="4725">
                 <a:solidFill>
                   <a:schemeClr val="tx1">
                     <a:tint val="75000"/>
@@ -1047,9 +924,9 @@
                 </a:solidFill>
               </a:defRPr>
             </a:lvl3pPr>
-            <a:lvl4pPr marL="1371600" indent="0">
-              <a:buNone/>
-              <a:defRPr sz="1600">
+            <a:lvl4pPr marL="3600176" indent="0">
+              <a:buNone/>
+              <a:defRPr sz="4200">
                 <a:solidFill>
                   <a:schemeClr val="tx1">
                     <a:tint val="75000"/>
@@ -1057,9 +934,9 @@
                 </a:solidFill>
               </a:defRPr>
             </a:lvl4pPr>
-            <a:lvl5pPr marL="1828800" indent="0">
-              <a:buNone/>
-              <a:defRPr sz="1600">
+            <a:lvl5pPr marL="4800234" indent="0">
+              <a:buNone/>
+              <a:defRPr sz="4200">
                 <a:solidFill>
                   <a:schemeClr val="tx1">
                     <a:tint val="75000"/>
@@ -1067,9 +944,9 @@
                 </a:solidFill>
               </a:defRPr>
             </a:lvl5pPr>
-            <a:lvl6pPr marL="2286000" indent="0">
-              <a:buNone/>
-              <a:defRPr sz="1600">
+            <a:lvl6pPr marL="6000293" indent="0">
+              <a:buNone/>
+              <a:defRPr sz="4200">
                 <a:solidFill>
                   <a:schemeClr val="tx1">
                     <a:tint val="75000"/>
@@ -1077,9 +954,9 @@
                 </a:solidFill>
               </a:defRPr>
             </a:lvl6pPr>
-            <a:lvl7pPr marL="2743200" indent="0">
-              <a:buNone/>
-              <a:defRPr sz="1600">
+            <a:lvl7pPr marL="7200351" indent="0">
+              <a:buNone/>
+              <a:defRPr sz="4200">
                 <a:solidFill>
                   <a:schemeClr val="tx1">
                     <a:tint val="75000"/>
@@ -1087,9 +964,9 @@
                 </a:solidFill>
               </a:defRPr>
             </a:lvl7pPr>
-            <a:lvl8pPr marL="3200400" indent="0">
-              <a:buNone/>
-              <a:defRPr sz="1600">
+            <a:lvl8pPr marL="8400410" indent="0">
+              <a:buNone/>
+              <a:defRPr sz="4200">
                 <a:solidFill>
                   <a:schemeClr val="tx1">
                     <a:tint val="75000"/>
@@ -1097,9 +974,9 @@
                 </a:solidFill>
               </a:defRPr>
             </a:lvl8pPr>
-            <a:lvl9pPr marL="3657600" indent="0">
-              <a:buNone/>
-              <a:defRPr sz="1600">
+            <a:lvl9pPr marL="9600468" indent="0">
+              <a:buNone/>
+              <a:defRPr sz="4200">
                 <a:solidFill>
                   <a:schemeClr val="tx1">
                     <a:tint val="75000"/>
@@ -1119,13 +996,7 @@
       </p:sp>
       <p:sp>
         <p:nvSpPr>
-          <p:cNvPr id="4" name="Date Placeholder 3">
-            <a:extLst>
-              <a:ext uri="{FF2B5EF4-FFF2-40B4-BE49-F238E27FC236}">
-                <a16:creationId xmlns:a16="http://schemas.microsoft.com/office/drawing/2014/main" id="{464E12FD-5A62-4A8C-A828-7791E8914EE7}"/>
-              </a:ext>
-            </a:extLst>
-          </p:cNvPr>
+          <p:cNvPr id="4" name="Date Placeholder 3"/>
           <p:cNvSpPr>
             <a:spLocks noGrp="1"/>
           </p:cNvSpPr>
@@ -1140,7 +1011,7 @@
           <a:p>
             <a:fld id="{76ABEC16-1E1A-40CE-AB5F-E22D57C0F079}" type="datetimeFigureOut">
               <a:rPr lang="en-US" smtClean="0"/>
-              <a:t>9/3/2021</a:t>
+              <a:t>9/7/2021</a:t>
             </a:fld>
             <a:endParaRPr lang="en-US"/>
           </a:p>
@@ -1148,13 +1019,7 @@
       </p:sp>
       <p:sp>
         <p:nvSpPr>
-          <p:cNvPr id="5" name="Footer Placeholder 4">
-            <a:extLst>
-              <a:ext uri="{FF2B5EF4-FFF2-40B4-BE49-F238E27FC236}">
-                <a16:creationId xmlns:a16="http://schemas.microsoft.com/office/drawing/2014/main" id="{135E8C49-6F41-4146-A562-1C59733096B5}"/>
-              </a:ext>
-            </a:extLst>
-          </p:cNvPr>
+          <p:cNvPr id="5" name="Footer Placeholder 4"/>
           <p:cNvSpPr>
             <a:spLocks noGrp="1"/>
           </p:cNvSpPr>
@@ -1173,13 +1038,7 @@
       </p:sp>
       <p:sp>
         <p:nvSpPr>
-          <p:cNvPr id="6" name="Slide Number Placeholder 5">
-            <a:extLst>
-              <a:ext uri="{FF2B5EF4-FFF2-40B4-BE49-F238E27FC236}">
-                <a16:creationId xmlns:a16="http://schemas.microsoft.com/office/drawing/2014/main" id="{6A635AE8-8209-4E38-84E4-714F10A60B41}"/>
-              </a:ext>
-            </a:extLst>
-          </p:cNvPr>
+          <p:cNvPr id="6" name="Slide Number Placeholder 5"/>
           <p:cNvSpPr>
             <a:spLocks noGrp="1"/>
           </p:cNvSpPr>
@@ -1203,7 +1062,7 @@
     </p:spTree>
     <p:extLst>
       <p:ext uri="{BB962C8B-B14F-4D97-AF65-F5344CB8AC3E}">
-        <p14:creationId xmlns:p14="http://schemas.microsoft.com/office/powerpoint/2010/main" val="1453767975"/>
+        <p14:creationId xmlns:p14="http://schemas.microsoft.com/office/powerpoint/2010/main" val="2211429632"/>
       </p:ext>
     </p:extLst>
   </p:cSld>
@@ -1232,13 +1091,7 @@
       </p:grpSpPr>
       <p:sp>
         <p:nvSpPr>
-          <p:cNvPr id="2" name="Title 1">
-            <a:extLst>
-              <a:ext uri="{FF2B5EF4-FFF2-40B4-BE49-F238E27FC236}">
-                <a16:creationId xmlns:a16="http://schemas.microsoft.com/office/drawing/2014/main" id="{A0197D9D-D41B-455B-AF9D-2A4DC96BD2F8}"/>
-              </a:ext>
-            </a:extLst>
-          </p:cNvPr>
+          <p:cNvPr id="2" name="Title 1"/>
           <p:cNvSpPr>
             <a:spLocks noGrp="1"/>
           </p:cNvSpPr>
@@ -1255,18 +1108,13 @@
               <a:rPr lang="en-US"/>
               <a:t>Click to edit Master title style</a:t>
             </a:r>
-          </a:p>
-        </p:txBody>
-      </p:sp>
-      <p:sp>
-        <p:nvSpPr>
-          <p:cNvPr id="3" name="Content Placeholder 2">
-            <a:extLst>
-              <a:ext uri="{FF2B5EF4-FFF2-40B4-BE49-F238E27FC236}">
-                <a16:creationId xmlns:a16="http://schemas.microsoft.com/office/drawing/2014/main" id="{C25FAB8D-7F24-4A3B-9FDF-101FAB3F4A46}"/>
-              </a:ext>
-            </a:extLst>
-          </p:cNvPr>
+            <a:endParaRPr lang="en-US" dirty="0"/>
+          </a:p>
+        </p:txBody>
+      </p:sp>
+      <p:sp>
+        <p:nvSpPr>
+          <p:cNvPr id="3" name="Content Placeholder 2"/>
           <p:cNvSpPr>
             <a:spLocks noGrp="1"/>
           </p:cNvSpPr>
@@ -1276,8 +1124,8 @@
         </p:nvSpPr>
         <p:spPr>
           <a:xfrm>
-            <a:off x="838200" y="1825625"/>
-            <a:ext cx="5181600" cy="4351338"/>
+            <a:off x="2474982" y="4791843"/>
+            <a:ext cx="15299889" cy="11421255"/>
           </a:xfrm>
         </p:spPr>
         <p:txBody>
@@ -1317,18 +1165,13 @@
               <a:rPr lang="en-US"/>
               <a:t>Fifth level</a:t>
             </a:r>
-          </a:p>
-        </p:txBody>
-      </p:sp>
-      <p:sp>
-        <p:nvSpPr>
-          <p:cNvPr id="4" name="Content Placeholder 3">
-            <a:extLst>
-              <a:ext uri="{FF2B5EF4-FFF2-40B4-BE49-F238E27FC236}">
-                <a16:creationId xmlns:a16="http://schemas.microsoft.com/office/drawing/2014/main" id="{14ACF0C5-6611-4A4F-919B-EADF838D7499}"/>
-              </a:ext>
-            </a:extLst>
-          </p:cNvPr>
+            <a:endParaRPr lang="en-US" dirty="0"/>
+          </a:p>
+        </p:txBody>
+      </p:sp>
+      <p:sp>
+        <p:nvSpPr>
+          <p:cNvPr id="4" name="Content Placeholder 3"/>
           <p:cNvSpPr>
             <a:spLocks noGrp="1"/>
           </p:cNvSpPr>
@@ -1338,8 +1181,8 @@
         </p:nvSpPr>
         <p:spPr>
           <a:xfrm>
-            <a:off x="6172200" y="1825625"/>
-            <a:ext cx="5181600" cy="4351338"/>
+            <a:off x="18224867" y="4791843"/>
+            <a:ext cx="15299889" cy="11421255"/>
           </a:xfrm>
         </p:spPr>
         <p:txBody>
@@ -1379,18 +1222,13 @@
               <a:rPr lang="en-US"/>
               <a:t>Fifth level</a:t>
             </a:r>
-          </a:p>
-        </p:txBody>
-      </p:sp>
-      <p:sp>
-        <p:nvSpPr>
-          <p:cNvPr id="5" name="Date Placeholder 4">
-            <a:extLst>
-              <a:ext uri="{FF2B5EF4-FFF2-40B4-BE49-F238E27FC236}">
-                <a16:creationId xmlns:a16="http://schemas.microsoft.com/office/drawing/2014/main" id="{E7B27BEC-0D73-4249-8807-542001889105}"/>
-              </a:ext>
-            </a:extLst>
-          </p:cNvPr>
+            <a:endParaRPr lang="en-US" dirty="0"/>
+          </a:p>
+        </p:txBody>
+      </p:sp>
+      <p:sp>
+        <p:nvSpPr>
+          <p:cNvPr id="5" name="Date Placeholder 4"/>
           <p:cNvSpPr>
             <a:spLocks noGrp="1"/>
           </p:cNvSpPr>
@@ -1405,7 +1243,7 @@
           <a:p>
             <a:fld id="{76ABEC16-1E1A-40CE-AB5F-E22D57C0F079}" type="datetimeFigureOut">
               <a:rPr lang="en-US" smtClean="0"/>
-              <a:t>9/3/2021</a:t>
+              <a:t>9/7/2021</a:t>
             </a:fld>
             <a:endParaRPr lang="en-US"/>
           </a:p>
@@ -1413,13 +1251,7 @@
       </p:sp>
       <p:sp>
         <p:nvSpPr>
-          <p:cNvPr id="6" name="Footer Placeholder 5">
-            <a:extLst>
-              <a:ext uri="{FF2B5EF4-FFF2-40B4-BE49-F238E27FC236}">
-                <a16:creationId xmlns:a16="http://schemas.microsoft.com/office/drawing/2014/main" id="{3EA51DA0-7BC0-4BDE-A92A-15E3DF7F46AF}"/>
-              </a:ext>
-            </a:extLst>
-          </p:cNvPr>
+          <p:cNvPr id="6" name="Footer Placeholder 5"/>
           <p:cNvSpPr>
             <a:spLocks noGrp="1"/>
           </p:cNvSpPr>
@@ -1438,13 +1270,7 @@
       </p:sp>
       <p:sp>
         <p:nvSpPr>
-          <p:cNvPr id="7" name="Slide Number Placeholder 6">
-            <a:extLst>
-              <a:ext uri="{FF2B5EF4-FFF2-40B4-BE49-F238E27FC236}">
-                <a16:creationId xmlns:a16="http://schemas.microsoft.com/office/drawing/2014/main" id="{6E933102-918C-43E7-BE41-3B8C5BC7689F}"/>
-              </a:ext>
-            </a:extLst>
-          </p:cNvPr>
+          <p:cNvPr id="7" name="Slide Number Placeholder 6"/>
           <p:cNvSpPr>
             <a:spLocks noGrp="1"/>
           </p:cNvSpPr>
@@ -1468,7 +1294,7 @@
     </p:spTree>
     <p:extLst>
       <p:ext uri="{BB962C8B-B14F-4D97-AF65-F5344CB8AC3E}">
-        <p14:creationId xmlns:p14="http://schemas.microsoft.com/office/powerpoint/2010/main" val="4079185432"/>
+        <p14:creationId xmlns:p14="http://schemas.microsoft.com/office/powerpoint/2010/main" val="2172302191"/>
       </p:ext>
     </p:extLst>
   </p:cSld>
@@ -1497,13 +1323,7 @@
       </p:grpSpPr>
       <p:sp>
         <p:nvSpPr>
-          <p:cNvPr id="2" name="Title 1">
-            <a:extLst>
-              <a:ext uri="{FF2B5EF4-FFF2-40B4-BE49-F238E27FC236}">
-                <a16:creationId xmlns:a16="http://schemas.microsoft.com/office/drawing/2014/main" id="{B32E2922-9225-4B7D-BDEC-FF6954BBAECD}"/>
-              </a:ext>
-            </a:extLst>
-          </p:cNvPr>
+          <p:cNvPr id="2" name="Title 1"/>
           <p:cNvSpPr>
             <a:spLocks noGrp="1"/>
           </p:cNvSpPr>
@@ -1513,8 +1333,8 @@
         </p:nvSpPr>
         <p:spPr>
           <a:xfrm>
-            <a:off x="839788" y="365125"/>
-            <a:ext cx="10515600" cy="1325563"/>
+            <a:off x="2479671" y="958370"/>
+            <a:ext cx="31049774" cy="3479296"/>
           </a:xfrm>
         </p:spPr>
         <p:txBody>
@@ -1525,18 +1345,13 @@
               <a:rPr lang="en-US"/>
               <a:t>Click to edit Master title style</a:t>
             </a:r>
-          </a:p>
-        </p:txBody>
-      </p:sp>
-      <p:sp>
-        <p:nvSpPr>
-          <p:cNvPr id="3" name="Text Placeholder 2">
-            <a:extLst>
-              <a:ext uri="{FF2B5EF4-FFF2-40B4-BE49-F238E27FC236}">
-                <a16:creationId xmlns:a16="http://schemas.microsoft.com/office/drawing/2014/main" id="{4990F0F1-53F5-4029-BA66-71D45B2C0E69}"/>
-              </a:ext>
-            </a:extLst>
-          </p:cNvPr>
+            <a:endParaRPr lang="en-US" dirty="0"/>
+          </a:p>
+        </p:txBody>
+      </p:sp>
+      <p:sp>
+        <p:nvSpPr>
+          <p:cNvPr id="3" name="Text Placeholder 2"/>
           <p:cNvSpPr>
             <a:spLocks noGrp="1"/>
           </p:cNvSpPr>
@@ -1546,8 +1361,8 @@
         </p:nvSpPr>
         <p:spPr>
           <a:xfrm>
-            <a:off x="839788" y="1681163"/>
-            <a:ext cx="5157787" cy="823912"/>
+            <a:off x="2479672" y="4412664"/>
+            <a:ext cx="15229575" cy="2162578"/>
           </a:xfrm>
         </p:spPr>
         <p:txBody>
@@ -1555,39 +1370,39 @@
           <a:lstStyle>
             <a:lvl1pPr marL="0" indent="0">
               <a:buNone/>
-              <a:defRPr sz="2400" b="1"/>
+              <a:defRPr sz="6300" b="1"/>
             </a:lvl1pPr>
-            <a:lvl2pPr marL="457200" indent="0">
-              <a:buNone/>
-              <a:defRPr sz="2000" b="1"/>
+            <a:lvl2pPr marL="1200059" indent="0">
+              <a:buNone/>
+              <a:defRPr sz="5250" b="1"/>
             </a:lvl2pPr>
-            <a:lvl3pPr marL="914400" indent="0">
-              <a:buNone/>
-              <a:defRPr sz="1800" b="1"/>
+            <a:lvl3pPr marL="2400117" indent="0">
+              <a:buNone/>
+              <a:defRPr sz="4725" b="1"/>
             </a:lvl3pPr>
-            <a:lvl4pPr marL="1371600" indent="0">
-              <a:buNone/>
-              <a:defRPr sz="1600" b="1"/>
+            <a:lvl4pPr marL="3600176" indent="0">
+              <a:buNone/>
+              <a:defRPr sz="4200" b="1"/>
             </a:lvl4pPr>
-            <a:lvl5pPr marL="1828800" indent="0">
-              <a:buNone/>
-              <a:defRPr sz="1600" b="1"/>
+            <a:lvl5pPr marL="4800234" indent="0">
+              <a:buNone/>
+              <a:defRPr sz="4200" b="1"/>
             </a:lvl5pPr>
-            <a:lvl6pPr marL="2286000" indent="0">
-              <a:buNone/>
-              <a:defRPr sz="1600" b="1"/>
+            <a:lvl6pPr marL="6000293" indent="0">
+              <a:buNone/>
+              <a:defRPr sz="4200" b="1"/>
             </a:lvl6pPr>
-            <a:lvl7pPr marL="2743200" indent="0">
-              <a:buNone/>
-              <a:defRPr sz="1600" b="1"/>
+            <a:lvl7pPr marL="7200351" indent="0">
+              <a:buNone/>
+              <a:defRPr sz="4200" b="1"/>
             </a:lvl7pPr>
-            <a:lvl8pPr marL="3200400" indent="0">
-              <a:buNone/>
-              <a:defRPr sz="1600" b="1"/>
+            <a:lvl8pPr marL="8400410" indent="0">
+              <a:buNone/>
+              <a:defRPr sz="4200" b="1"/>
             </a:lvl8pPr>
-            <a:lvl9pPr marL="3657600" indent="0">
-              <a:buNone/>
-              <a:defRPr sz="1600" b="1"/>
+            <a:lvl9pPr marL="9600468" indent="0">
+              <a:buNone/>
+              <a:defRPr sz="4200" b="1"/>
             </a:lvl9pPr>
           </a:lstStyle>
           <a:p>
@@ -1601,13 +1416,7 @@
       </p:sp>
       <p:sp>
         <p:nvSpPr>
-          <p:cNvPr id="4" name="Content Placeholder 3">
-            <a:extLst>
-              <a:ext uri="{FF2B5EF4-FFF2-40B4-BE49-F238E27FC236}">
-                <a16:creationId xmlns:a16="http://schemas.microsoft.com/office/drawing/2014/main" id="{93A11261-7CD9-4B54-8EC8-499FD2303247}"/>
-              </a:ext>
-            </a:extLst>
-          </p:cNvPr>
+          <p:cNvPr id="4" name="Content Placeholder 3"/>
           <p:cNvSpPr>
             <a:spLocks noGrp="1"/>
           </p:cNvSpPr>
@@ -1617,8 +1426,8 @@
         </p:nvSpPr>
         <p:spPr>
           <a:xfrm>
-            <a:off x="839788" y="2505075"/>
-            <a:ext cx="5157787" cy="3684588"/>
+            <a:off x="2479672" y="6575242"/>
+            <a:ext cx="15229575" cy="9671191"/>
           </a:xfrm>
         </p:spPr>
         <p:txBody>
@@ -1658,18 +1467,13 @@
               <a:rPr lang="en-US"/>
               <a:t>Fifth level</a:t>
             </a:r>
-          </a:p>
-        </p:txBody>
-      </p:sp>
-      <p:sp>
-        <p:nvSpPr>
-          <p:cNvPr id="5" name="Text Placeholder 4">
-            <a:extLst>
-              <a:ext uri="{FF2B5EF4-FFF2-40B4-BE49-F238E27FC236}">
-                <a16:creationId xmlns:a16="http://schemas.microsoft.com/office/drawing/2014/main" id="{AB132E19-EE78-42AF-A2FC-9D8D2CB886DD}"/>
-              </a:ext>
-            </a:extLst>
-          </p:cNvPr>
+            <a:endParaRPr lang="en-US" dirty="0"/>
+          </a:p>
+        </p:txBody>
+      </p:sp>
+      <p:sp>
+        <p:nvSpPr>
+          <p:cNvPr id="5" name="Text Placeholder 4"/>
           <p:cNvSpPr>
             <a:spLocks noGrp="1"/>
           </p:cNvSpPr>
@@ -1679,8 +1483,8 @@
         </p:nvSpPr>
         <p:spPr>
           <a:xfrm>
-            <a:off x="6172200" y="1681163"/>
-            <a:ext cx="5183188" cy="823912"/>
+            <a:off x="18224867" y="4412664"/>
+            <a:ext cx="15304578" cy="2162578"/>
           </a:xfrm>
         </p:spPr>
         <p:txBody>
@@ -1688,39 +1492,39 @@
           <a:lstStyle>
             <a:lvl1pPr marL="0" indent="0">
               <a:buNone/>
-              <a:defRPr sz="2400" b="1"/>
+              <a:defRPr sz="6300" b="1"/>
             </a:lvl1pPr>
-            <a:lvl2pPr marL="457200" indent="0">
-              <a:buNone/>
-              <a:defRPr sz="2000" b="1"/>
+            <a:lvl2pPr marL="1200059" indent="0">
+              <a:buNone/>
+              <a:defRPr sz="5250" b="1"/>
             </a:lvl2pPr>
-            <a:lvl3pPr marL="914400" indent="0">
-              <a:buNone/>
-              <a:defRPr sz="1800" b="1"/>
+            <a:lvl3pPr marL="2400117" indent="0">
+              <a:buNone/>
+              <a:defRPr sz="4725" b="1"/>
             </a:lvl3pPr>
-            <a:lvl4pPr marL="1371600" indent="0">
-              <a:buNone/>
-              <a:defRPr sz="1600" b="1"/>
+            <a:lvl4pPr marL="3600176" indent="0">
+              <a:buNone/>
+              <a:defRPr sz="4200" b="1"/>
             </a:lvl4pPr>
-            <a:lvl5pPr marL="1828800" indent="0">
-              <a:buNone/>
-              <a:defRPr sz="1600" b="1"/>
+            <a:lvl5pPr marL="4800234" indent="0">
+              <a:buNone/>
+              <a:defRPr sz="4200" b="1"/>
             </a:lvl5pPr>
-            <a:lvl6pPr marL="2286000" indent="0">
-              <a:buNone/>
-              <a:defRPr sz="1600" b="1"/>
+            <a:lvl6pPr marL="6000293" indent="0">
+              <a:buNone/>
+              <a:defRPr sz="4200" b="1"/>
             </a:lvl6pPr>
-            <a:lvl7pPr marL="2743200" indent="0">
-              <a:buNone/>
-              <a:defRPr sz="1600" b="1"/>
+            <a:lvl7pPr marL="7200351" indent="0">
+              <a:buNone/>
+              <a:defRPr sz="4200" b="1"/>
             </a:lvl7pPr>
-            <a:lvl8pPr marL="3200400" indent="0">
-              <a:buNone/>
-              <a:defRPr sz="1600" b="1"/>
+            <a:lvl8pPr marL="8400410" indent="0">
+              <a:buNone/>
+              <a:defRPr sz="4200" b="1"/>
             </a:lvl8pPr>
-            <a:lvl9pPr marL="3657600" indent="0">
-              <a:buNone/>
-              <a:defRPr sz="1600" b="1"/>
+            <a:lvl9pPr marL="9600468" indent="0">
+              <a:buNone/>
+              <a:defRPr sz="4200" b="1"/>
             </a:lvl9pPr>
           </a:lstStyle>
           <a:p>
@@ -1734,13 +1538,7 @@
       </p:sp>
       <p:sp>
         <p:nvSpPr>
-          <p:cNvPr id="6" name="Content Placeholder 5">
-            <a:extLst>
-              <a:ext uri="{FF2B5EF4-FFF2-40B4-BE49-F238E27FC236}">
-                <a16:creationId xmlns:a16="http://schemas.microsoft.com/office/drawing/2014/main" id="{8E2E5222-7AFD-42AC-853E-DA16817F5E71}"/>
-              </a:ext>
-            </a:extLst>
-          </p:cNvPr>
+          <p:cNvPr id="6" name="Content Placeholder 5"/>
           <p:cNvSpPr>
             <a:spLocks noGrp="1"/>
           </p:cNvSpPr>
@@ -1750,8 +1548,8 @@
         </p:nvSpPr>
         <p:spPr>
           <a:xfrm>
-            <a:off x="6172200" y="2505075"/>
-            <a:ext cx="5183188" cy="3684588"/>
+            <a:off x="18224867" y="6575242"/>
+            <a:ext cx="15304578" cy="9671191"/>
           </a:xfrm>
         </p:spPr>
         <p:txBody>
@@ -1791,18 +1589,13 @@
               <a:rPr lang="en-US"/>
               <a:t>Fifth level</a:t>
             </a:r>
-          </a:p>
-        </p:txBody>
-      </p:sp>
-      <p:sp>
-        <p:nvSpPr>
-          <p:cNvPr id="7" name="Date Placeholder 6">
-            <a:extLst>
-              <a:ext uri="{FF2B5EF4-FFF2-40B4-BE49-F238E27FC236}">
-                <a16:creationId xmlns:a16="http://schemas.microsoft.com/office/drawing/2014/main" id="{3874E53A-8862-4A75-9EB7-A7C05DB5AFF5}"/>
-              </a:ext>
-            </a:extLst>
-          </p:cNvPr>
+            <a:endParaRPr lang="en-US" dirty="0"/>
+          </a:p>
+        </p:txBody>
+      </p:sp>
+      <p:sp>
+        <p:nvSpPr>
+          <p:cNvPr id="7" name="Date Placeholder 6"/>
           <p:cNvSpPr>
             <a:spLocks noGrp="1"/>
           </p:cNvSpPr>
@@ -1817,7 +1610,7 @@
           <a:p>
             <a:fld id="{76ABEC16-1E1A-40CE-AB5F-E22D57C0F079}" type="datetimeFigureOut">
               <a:rPr lang="en-US" smtClean="0"/>
-              <a:t>9/3/2021</a:t>
+              <a:t>9/7/2021</a:t>
             </a:fld>
             <a:endParaRPr lang="en-US"/>
           </a:p>
@@ -1825,13 +1618,7 @@
       </p:sp>
       <p:sp>
         <p:nvSpPr>
-          <p:cNvPr id="8" name="Footer Placeholder 7">
-            <a:extLst>
-              <a:ext uri="{FF2B5EF4-FFF2-40B4-BE49-F238E27FC236}">
-                <a16:creationId xmlns:a16="http://schemas.microsoft.com/office/drawing/2014/main" id="{94695732-EC4E-48CA-8827-711514007532}"/>
-              </a:ext>
-            </a:extLst>
-          </p:cNvPr>
+          <p:cNvPr id="8" name="Footer Placeholder 7"/>
           <p:cNvSpPr>
             <a:spLocks noGrp="1"/>
           </p:cNvSpPr>
@@ -1850,13 +1637,7 @@
       </p:sp>
       <p:sp>
         <p:nvSpPr>
-          <p:cNvPr id="9" name="Slide Number Placeholder 8">
-            <a:extLst>
-              <a:ext uri="{FF2B5EF4-FFF2-40B4-BE49-F238E27FC236}">
-                <a16:creationId xmlns:a16="http://schemas.microsoft.com/office/drawing/2014/main" id="{FBC8C7F4-448D-4E94-AB8B-52F76DD47571}"/>
-              </a:ext>
-            </a:extLst>
-          </p:cNvPr>
+          <p:cNvPr id="9" name="Slide Number Placeholder 8"/>
           <p:cNvSpPr>
             <a:spLocks noGrp="1"/>
           </p:cNvSpPr>
@@ -1880,7 +1661,7 @@
     </p:spTree>
     <p:extLst>
       <p:ext uri="{BB962C8B-B14F-4D97-AF65-F5344CB8AC3E}">
-        <p14:creationId xmlns:p14="http://schemas.microsoft.com/office/powerpoint/2010/main" val="3573754313"/>
+        <p14:creationId xmlns:p14="http://schemas.microsoft.com/office/powerpoint/2010/main" val="3523361424"/>
       </p:ext>
     </p:extLst>
   </p:cSld>
@@ -1909,13 +1690,7 @@
       </p:grpSpPr>
       <p:sp>
         <p:nvSpPr>
-          <p:cNvPr id="2" name="Title 1">
-            <a:extLst>
-              <a:ext uri="{FF2B5EF4-FFF2-40B4-BE49-F238E27FC236}">
-                <a16:creationId xmlns:a16="http://schemas.microsoft.com/office/drawing/2014/main" id="{E1EF8290-07AC-4654-9556-CD37CE513F8B}"/>
-              </a:ext>
-            </a:extLst>
-          </p:cNvPr>
+          <p:cNvPr id="2" name="Title 1"/>
           <p:cNvSpPr>
             <a:spLocks noGrp="1"/>
           </p:cNvSpPr>
@@ -1932,18 +1707,13 @@
               <a:rPr lang="en-US"/>
               <a:t>Click to edit Master title style</a:t>
             </a:r>
-          </a:p>
-        </p:txBody>
-      </p:sp>
-      <p:sp>
-        <p:nvSpPr>
-          <p:cNvPr id="3" name="Date Placeholder 2">
-            <a:extLst>
-              <a:ext uri="{FF2B5EF4-FFF2-40B4-BE49-F238E27FC236}">
-                <a16:creationId xmlns:a16="http://schemas.microsoft.com/office/drawing/2014/main" id="{2823BB93-93E2-4EA5-BB64-7D17F5A8E88F}"/>
-              </a:ext>
-            </a:extLst>
-          </p:cNvPr>
+            <a:endParaRPr lang="en-US" dirty="0"/>
+          </a:p>
+        </p:txBody>
+      </p:sp>
+      <p:sp>
+        <p:nvSpPr>
+          <p:cNvPr id="3" name="Date Placeholder 2"/>
           <p:cNvSpPr>
             <a:spLocks noGrp="1"/>
           </p:cNvSpPr>
@@ -1958,7 +1728,7 @@
           <a:p>
             <a:fld id="{76ABEC16-1E1A-40CE-AB5F-E22D57C0F079}" type="datetimeFigureOut">
               <a:rPr lang="en-US" smtClean="0"/>
-              <a:t>9/3/2021</a:t>
+              <a:t>9/7/2021</a:t>
             </a:fld>
             <a:endParaRPr lang="en-US"/>
           </a:p>
@@ -1966,13 +1736,7 @@
       </p:sp>
       <p:sp>
         <p:nvSpPr>
-          <p:cNvPr id="4" name="Footer Placeholder 3">
-            <a:extLst>
-              <a:ext uri="{FF2B5EF4-FFF2-40B4-BE49-F238E27FC236}">
-                <a16:creationId xmlns:a16="http://schemas.microsoft.com/office/drawing/2014/main" id="{160C6C7C-D7A7-4764-BA7F-3C5779939B44}"/>
-              </a:ext>
-            </a:extLst>
-          </p:cNvPr>
+          <p:cNvPr id="4" name="Footer Placeholder 3"/>
           <p:cNvSpPr>
             <a:spLocks noGrp="1"/>
           </p:cNvSpPr>
@@ -1991,13 +1755,7 @@
       </p:sp>
       <p:sp>
         <p:nvSpPr>
-          <p:cNvPr id="5" name="Slide Number Placeholder 4">
-            <a:extLst>
-              <a:ext uri="{FF2B5EF4-FFF2-40B4-BE49-F238E27FC236}">
-                <a16:creationId xmlns:a16="http://schemas.microsoft.com/office/drawing/2014/main" id="{03BAE6BF-15F5-4962-9A3B-1673426FCD6A}"/>
-              </a:ext>
-            </a:extLst>
-          </p:cNvPr>
+          <p:cNvPr id="5" name="Slide Number Placeholder 4"/>
           <p:cNvSpPr>
             <a:spLocks noGrp="1"/>
           </p:cNvSpPr>
@@ -2021,7 +1779,7 @@
     </p:spTree>
     <p:extLst>
       <p:ext uri="{BB962C8B-B14F-4D97-AF65-F5344CB8AC3E}">
-        <p14:creationId xmlns:p14="http://schemas.microsoft.com/office/powerpoint/2010/main" val="2012594746"/>
+        <p14:creationId xmlns:p14="http://schemas.microsoft.com/office/powerpoint/2010/main" val="134585198"/>
       </p:ext>
     </p:extLst>
   </p:cSld>
@@ -2050,13 +1808,7 @@
       </p:grpSpPr>
       <p:sp>
         <p:nvSpPr>
-          <p:cNvPr id="2" name="Date Placeholder 1">
-            <a:extLst>
-              <a:ext uri="{FF2B5EF4-FFF2-40B4-BE49-F238E27FC236}">
-                <a16:creationId xmlns:a16="http://schemas.microsoft.com/office/drawing/2014/main" id="{DB59D00D-A063-4BFF-B48A-0259EEE34FFF}"/>
-              </a:ext>
-            </a:extLst>
-          </p:cNvPr>
+          <p:cNvPr id="2" name="Date Placeholder 1"/>
           <p:cNvSpPr>
             <a:spLocks noGrp="1"/>
           </p:cNvSpPr>
@@ -2071,7 +1823,7 @@
           <a:p>
             <a:fld id="{76ABEC16-1E1A-40CE-AB5F-E22D57C0F079}" type="datetimeFigureOut">
               <a:rPr lang="en-US" smtClean="0"/>
-              <a:t>9/3/2021</a:t>
+              <a:t>9/7/2021</a:t>
             </a:fld>
             <a:endParaRPr lang="en-US"/>
           </a:p>
@@ -2079,13 +1831,7 @@
       </p:sp>
       <p:sp>
         <p:nvSpPr>
-          <p:cNvPr id="3" name="Footer Placeholder 2">
-            <a:extLst>
-              <a:ext uri="{FF2B5EF4-FFF2-40B4-BE49-F238E27FC236}">
-                <a16:creationId xmlns:a16="http://schemas.microsoft.com/office/drawing/2014/main" id="{F1957C23-9AEF-44CC-981F-DCE6A80DF11F}"/>
-              </a:ext>
-            </a:extLst>
-          </p:cNvPr>
+          <p:cNvPr id="3" name="Footer Placeholder 2"/>
           <p:cNvSpPr>
             <a:spLocks noGrp="1"/>
           </p:cNvSpPr>
@@ -2104,13 +1850,7 @@
       </p:sp>
       <p:sp>
         <p:nvSpPr>
-          <p:cNvPr id="4" name="Slide Number Placeholder 3">
-            <a:extLst>
-              <a:ext uri="{FF2B5EF4-FFF2-40B4-BE49-F238E27FC236}">
-                <a16:creationId xmlns:a16="http://schemas.microsoft.com/office/drawing/2014/main" id="{82E95CD9-6926-4A9D-BD8B-45EBEEAA4D00}"/>
-              </a:ext>
-            </a:extLst>
-          </p:cNvPr>
+          <p:cNvPr id="4" name="Slide Number Placeholder 3"/>
           <p:cNvSpPr>
             <a:spLocks noGrp="1"/>
           </p:cNvSpPr>
@@ -2134,7 +1874,7 @@
     </p:spTree>
     <p:extLst>
       <p:ext uri="{BB962C8B-B14F-4D97-AF65-F5344CB8AC3E}">
-        <p14:creationId xmlns:p14="http://schemas.microsoft.com/office/powerpoint/2010/main" val="3287740828"/>
+        <p14:creationId xmlns:p14="http://schemas.microsoft.com/office/powerpoint/2010/main" val="2126672408"/>
       </p:ext>
     </p:extLst>
   </p:cSld>
@@ -2163,13 +1903,7 @@
       </p:grpSpPr>
       <p:sp>
         <p:nvSpPr>
-          <p:cNvPr id="2" name="Title 1">
-            <a:extLst>
-              <a:ext uri="{FF2B5EF4-FFF2-40B4-BE49-F238E27FC236}">
-                <a16:creationId xmlns:a16="http://schemas.microsoft.com/office/drawing/2014/main" id="{15C3D09F-0087-46E7-8032-8BF678488B76}"/>
-              </a:ext>
-            </a:extLst>
-          </p:cNvPr>
+          <p:cNvPr id="2" name="Title 1"/>
           <p:cNvSpPr>
             <a:spLocks noGrp="1"/>
           </p:cNvSpPr>
@@ -2179,15 +1913,15 @@
         </p:nvSpPr>
         <p:spPr>
           <a:xfrm>
-            <a:off x="839788" y="457200"/>
-            <a:ext cx="3932237" cy="1600200"/>
+            <a:off x="2479672" y="1200044"/>
+            <a:ext cx="11610852" cy="4200155"/>
           </a:xfrm>
         </p:spPr>
         <p:txBody>
           <a:bodyPr anchor="b"/>
           <a:lstStyle>
             <a:lvl1pPr>
-              <a:defRPr sz="3200"/>
+              <a:defRPr sz="8399"/>
             </a:lvl1pPr>
           </a:lstStyle>
           <a:p>
@@ -2195,18 +1929,13 @@
               <a:rPr lang="en-US"/>
               <a:t>Click to edit Master title style</a:t>
             </a:r>
-          </a:p>
-        </p:txBody>
-      </p:sp>
-      <p:sp>
-        <p:nvSpPr>
-          <p:cNvPr id="3" name="Content Placeholder 2">
-            <a:extLst>
-              <a:ext uri="{FF2B5EF4-FFF2-40B4-BE49-F238E27FC236}">
-                <a16:creationId xmlns:a16="http://schemas.microsoft.com/office/drawing/2014/main" id="{C0CCDCD0-800C-4865-8E86-747C3DA1CDE6}"/>
-              </a:ext>
-            </a:extLst>
-          </p:cNvPr>
+            <a:endParaRPr lang="en-US" dirty="0"/>
+          </a:p>
+        </p:txBody>
+      </p:sp>
+      <p:sp>
+        <p:nvSpPr>
+          <p:cNvPr id="3" name="Content Placeholder 2"/>
           <p:cNvSpPr>
             <a:spLocks noGrp="1"/>
           </p:cNvSpPr>
@@ -2216,39 +1945,39 @@
         </p:nvSpPr>
         <p:spPr>
           <a:xfrm>
-            <a:off x="5183188" y="987425"/>
-            <a:ext cx="6172200" cy="4873625"/>
+            <a:off x="15304578" y="2591763"/>
+            <a:ext cx="18224867" cy="12792138"/>
           </a:xfrm>
         </p:spPr>
         <p:txBody>
           <a:bodyPr/>
           <a:lstStyle>
             <a:lvl1pPr>
-              <a:defRPr sz="3200"/>
+              <a:defRPr sz="8399"/>
             </a:lvl1pPr>
             <a:lvl2pPr>
-              <a:defRPr sz="2800"/>
+              <a:defRPr sz="7349"/>
             </a:lvl2pPr>
             <a:lvl3pPr>
-              <a:defRPr sz="2400"/>
+              <a:defRPr sz="6300"/>
             </a:lvl3pPr>
             <a:lvl4pPr>
-              <a:defRPr sz="2000"/>
+              <a:defRPr sz="5250"/>
             </a:lvl4pPr>
             <a:lvl5pPr>
-              <a:defRPr sz="2000"/>
+              <a:defRPr sz="5250"/>
             </a:lvl5pPr>
             <a:lvl6pPr>
-              <a:defRPr sz="2000"/>
+              <a:defRPr sz="5250"/>
             </a:lvl6pPr>
             <a:lvl7pPr>
-              <a:defRPr sz="2000"/>
+              <a:defRPr sz="5250"/>
             </a:lvl7pPr>
             <a:lvl8pPr>
-              <a:defRPr sz="2000"/>
+              <a:defRPr sz="5250"/>
             </a:lvl8pPr>
             <a:lvl9pPr>
-              <a:defRPr sz="2000"/>
+              <a:defRPr sz="5250"/>
             </a:lvl9pPr>
           </a:lstStyle>
           <a:p>
@@ -2285,18 +2014,13 @@
               <a:rPr lang="en-US"/>
               <a:t>Fifth level</a:t>
             </a:r>
-          </a:p>
-        </p:txBody>
-      </p:sp>
-      <p:sp>
-        <p:nvSpPr>
-          <p:cNvPr id="4" name="Text Placeholder 3">
-            <a:extLst>
-              <a:ext uri="{FF2B5EF4-FFF2-40B4-BE49-F238E27FC236}">
-                <a16:creationId xmlns:a16="http://schemas.microsoft.com/office/drawing/2014/main" id="{F00FD08D-A70A-4201-9A44-6CB0786EC6A6}"/>
-              </a:ext>
-            </a:extLst>
-          </p:cNvPr>
+            <a:endParaRPr lang="en-US" dirty="0"/>
+          </a:p>
+        </p:txBody>
+      </p:sp>
+      <p:sp>
+        <p:nvSpPr>
+          <p:cNvPr id="4" name="Text Placeholder 3"/>
           <p:cNvSpPr>
             <a:spLocks noGrp="1"/>
           </p:cNvSpPr>
@@ -2306,8 +2030,8 @@
         </p:nvSpPr>
         <p:spPr>
           <a:xfrm>
-            <a:off x="839788" y="2057400"/>
-            <a:ext cx="3932237" cy="3811588"/>
+            <a:off x="2479672" y="5400199"/>
+            <a:ext cx="11610852" cy="10004536"/>
           </a:xfrm>
         </p:spPr>
         <p:txBody>
@@ -2315,39 +2039,39 @@
           <a:lstStyle>
             <a:lvl1pPr marL="0" indent="0">
               <a:buNone/>
-              <a:defRPr sz="1600"/>
+              <a:defRPr sz="4200"/>
             </a:lvl1pPr>
-            <a:lvl2pPr marL="457200" indent="0">
-              <a:buNone/>
-              <a:defRPr sz="1400"/>
+            <a:lvl2pPr marL="1200059" indent="0">
+              <a:buNone/>
+              <a:defRPr sz="3675"/>
             </a:lvl2pPr>
-            <a:lvl3pPr marL="914400" indent="0">
-              <a:buNone/>
-              <a:defRPr sz="1200"/>
+            <a:lvl3pPr marL="2400117" indent="0">
+              <a:buNone/>
+              <a:defRPr sz="3150"/>
             </a:lvl3pPr>
-            <a:lvl4pPr marL="1371600" indent="0">
-              <a:buNone/>
-              <a:defRPr sz="1000"/>
+            <a:lvl4pPr marL="3600176" indent="0">
+              <a:buNone/>
+              <a:defRPr sz="2625"/>
             </a:lvl4pPr>
-            <a:lvl5pPr marL="1828800" indent="0">
-              <a:buNone/>
-              <a:defRPr sz="1000"/>
+            <a:lvl5pPr marL="4800234" indent="0">
+              <a:buNone/>
+              <a:defRPr sz="2625"/>
             </a:lvl5pPr>
-            <a:lvl6pPr marL="2286000" indent="0">
-              <a:buNone/>
-              <a:defRPr sz="1000"/>
+            <a:lvl6pPr marL="6000293" indent="0">
+              <a:buNone/>
+              <a:defRPr sz="2625"/>
             </a:lvl6pPr>
-            <a:lvl7pPr marL="2743200" indent="0">
-              <a:buNone/>
-              <a:defRPr sz="1000"/>
+            <a:lvl7pPr marL="7200351" indent="0">
+              <a:buNone/>
+              <a:defRPr sz="2625"/>
             </a:lvl7pPr>
-            <a:lvl8pPr marL="3200400" indent="0">
-              <a:buNone/>
-              <a:defRPr sz="1000"/>
+            <a:lvl8pPr marL="8400410" indent="0">
+              <a:buNone/>
+              <a:defRPr sz="2625"/>
             </a:lvl8pPr>
-            <a:lvl9pPr marL="3657600" indent="0">
-              <a:buNone/>
-              <a:defRPr sz="1000"/>
+            <a:lvl9pPr marL="9600468" indent="0">
+              <a:buNone/>
+              <a:defRPr sz="2625"/>
             </a:lvl9pPr>
           </a:lstStyle>
           <a:p>
@@ -2361,13 +2085,7 @@
       </p:sp>
       <p:sp>
         <p:nvSpPr>
-          <p:cNvPr id="5" name="Date Placeholder 4">
-            <a:extLst>
-              <a:ext uri="{FF2B5EF4-FFF2-40B4-BE49-F238E27FC236}">
-                <a16:creationId xmlns:a16="http://schemas.microsoft.com/office/drawing/2014/main" id="{78E04ED4-6594-42BB-B4D4-29D1134A531A}"/>
-              </a:ext>
-            </a:extLst>
-          </p:cNvPr>
+          <p:cNvPr id="5" name="Date Placeholder 4"/>
           <p:cNvSpPr>
             <a:spLocks noGrp="1"/>
           </p:cNvSpPr>
@@ -2382,7 +2100,7 @@
           <a:p>
             <a:fld id="{76ABEC16-1E1A-40CE-AB5F-E22D57C0F079}" type="datetimeFigureOut">
               <a:rPr lang="en-US" smtClean="0"/>
-              <a:t>9/3/2021</a:t>
+              <a:t>9/7/2021</a:t>
             </a:fld>
             <a:endParaRPr lang="en-US"/>
           </a:p>
@@ -2390,13 +2108,7 @@
       </p:sp>
       <p:sp>
         <p:nvSpPr>
-          <p:cNvPr id="6" name="Footer Placeholder 5">
-            <a:extLst>
-              <a:ext uri="{FF2B5EF4-FFF2-40B4-BE49-F238E27FC236}">
-                <a16:creationId xmlns:a16="http://schemas.microsoft.com/office/drawing/2014/main" id="{1038EDE4-765F-4153-AB16-45562AF0F2FD}"/>
-              </a:ext>
-            </a:extLst>
-          </p:cNvPr>
+          <p:cNvPr id="6" name="Footer Placeholder 5"/>
           <p:cNvSpPr>
             <a:spLocks noGrp="1"/>
           </p:cNvSpPr>
@@ -2415,13 +2127,7 @@
       </p:sp>
       <p:sp>
         <p:nvSpPr>
-          <p:cNvPr id="7" name="Slide Number Placeholder 6">
-            <a:extLst>
-              <a:ext uri="{FF2B5EF4-FFF2-40B4-BE49-F238E27FC236}">
-                <a16:creationId xmlns:a16="http://schemas.microsoft.com/office/drawing/2014/main" id="{E502121E-CF14-4BFE-A478-F06B56FDD369}"/>
-              </a:ext>
-            </a:extLst>
-          </p:cNvPr>
+          <p:cNvPr id="7" name="Slide Number Placeholder 6"/>
           <p:cNvSpPr>
             <a:spLocks noGrp="1"/>
           </p:cNvSpPr>
@@ -2445,7 +2151,7 @@
     </p:spTree>
     <p:extLst>
       <p:ext uri="{BB962C8B-B14F-4D97-AF65-F5344CB8AC3E}">
-        <p14:creationId xmlns:p14="http://schemas.microsoft.com/office/powerpoint/2010/main" val="4198979025"/>
+        <p14:creationId xmlns:p14="http://schemas.microsoft.com/office/powerpoint/2010/main" val="1653379257"/>
       </p:ext>
     </p:extLst>
   </p:cSld>
@@ -2474,13 +2180,7 @@
       </p:grpSpPr>
       <p:sp>
         <p:nvSpPr>
-          <p:cNvPr id="2" name="Title 1">
-            <a:extLst>
-              <a:ext uri="{FF2B5EF4-FFF2-40B4-BE49-F238E27FC236}">
-                <a16:creationId xmlns:a16="http://schemas.microsoft.com/office/drawing/2014/main" id="{B1AD5E06-04A2-4020-99E9-311F45C8EAD2}"/>
-              </a:ext>
-            </a:extLst>
-          </p:cNvPr>
+          <p:cNvPr id="2" name="Title 1"/>
           <p:cNvSpPr>
             <a:spLocks noGrp="1"/>
           </p:cNvSpPr>
@@ -2490,15 +2190,15 @@
         </p:nvSpPr>
         <p:spPr>
           <a:xfrm>
-            <a:off x="839788" y="457200"/>
-            <a:ext cx="3932237" cy="1600200"/>
+            <a:off x="2479672" y="1200044"/>
+            <a:ext cx="11610852" cy="4200155"/>
           </a:xfrm>
         </p:spPr>
         <p:txBody>
           <a:bodyPr anchor="b"/>
           <a:lstStyle>
             <a:lvl1pPr>
-              <a:defRPr sz="3200"/>
+              <a:defRPr sz="8399"/>
             </a:lvl1pPr>
           </a:lstStyle>
           <a:p>
@@ -2506,20 +2206,15 @@
               <a:rPr lang="en-US"/>
               <a:t>Click to edit Master title style</a:t>
             </a:r>
-          </a:p>
-        </p:txBody>
-      </p:sp>
-      <p:sp>
-        <p:nvSpPr>
-          <p:cNvPr id="3" name="Picture Placeholder 2">
-            <a:extLst>
-              <a:ext uri="{FF2B5EF4-FFF2-40B4-BE49-F238E27FC236}">
-                <a16:creationId xmlns:a16="http://schemas.microsoft.com/office/drawing/2014/main" id="{EF96822A-75B3-4C36-9EDA-18C04856539B}"/>
-              </a:ext>
-            </a:extLst>
-          </p:cNvPr>
-          <p:cNvSpPr>
-            <a:spLocks noGrp="1"/>
+            <a:endParaRPr lang="en-US" dirty="0"/>
+          </a:p>
+        </p:txBody>
+      </p:sp>
+      <p:sp>
+        <p:nvSpPr>
+          <p:cNvPr id="3" name="Picture Placeholder 2"/>
+          <p:cNvSpPr>
+            <a:spLocks noGrp="1" noChangeAspect="1"/>
           </p:cNvSpPr>
           <p:nvPr>
             <p:ph type="pic" idx="1"/>
@@ -2527,8 +2222,73 @@
         </p:nvSpPr>
         <p:spPr>
           <a:xfrm>
-            <a:off x="5183188" y="987425"/>
-            <a:ext cx="6172200" cy="4873625"/>
+            <a:off x="15304578" y="2591763"/>
+            <a:ext cx="18224867" cy="12792138"/>
+          </a:xfrm>
+        </p:spPr>
+        <p:txBody>
+          <a:bodyPr anchor="t"/>
+          <a:lstStyle>
+            <a:lvl1pPr marL="0" indent="0">
+              <a:buNone/>
+              <a:defRPr sz="8399"/>
+            </a:lvl1pPr>
+            <a:lvl2pPr marL="1200059" indent="0">
+              <a:buNone/>
+              <a:defRPr sz="7349"/>
+            </a:lvl2pPr>
+            <a:lvl3pPr marL="2400117" indent="0">
+              <a:buNone/>
+              <a:defRPr sz="6300"/>
+            </a:lvl3pPr>
+            <a:lvl4pPr marL="3600176" indent="0">
+              <a:buNone/>
+              <a:defRPr sz="5250"/>
+            </a:lvl4pPr>
+            <a:lvl5pPr marL="4800234" indent="0">
+              <a:buNone/>
+              <a:defRPr sz="5250"/>
+            </a:lvl5pPr>
+            <a:lvl6pPr marL="6000293" indent="0">
+              <a:buNone/>
+              <a:defRPr sz="5250"/>
+            </a:lvl6pPr>
+            <a:lvl7pPr marL="7200351" indent="0">
+              <a:buNone/>
+              <a:defRPr sz="5250"/>
+            </a:lvl7pPr>
+            <a:lvl8pPr marL="8400410" indent="0">
+              <a:buNone/>
+              <a:defRPr sz="5250"/>
+            </a:lvl8pPr>
+            <a:lvl9pPr marL="9600468" indent="0">
+              <a:buNone/>
+              <a:defRPr sz="5250"/>
+            </a:lvl9pPr>
+          </a:lstStyle>
+          <a:p>
+            <a:r>
+              <a:rPr lang="en-US"/>
+              <a:t>Click icon to add picture</a:t>
+            </a:r>
+            <a:endParaRPr lang="en-US" dirty="0"/>
+          </a:p>
+        </p:txBody>
+      </p:sp>
+      <p:sp>
+        <p:nvSpPr>
+          <p:cNvPr id="4" name="Text Placeholder 3"/>
+          <p:cNvSpPr>
+            <a:spLocks noGrp="1"/>
+          </p:cNvSpPr>
+          <p:nvPr>
+            <p:ph type="body" sz="half" idx="2"/>
+          </p:nvPr>
+        </p:nvSpPr>
+        <p:spPr>
+          <a:xfrm>
+            <a:off x="2479672" y="5400199"/>
+            <a:ext cx="11610852" cy="10004536"/>
           </a:xfrm>
         </p:spPr>
         <p:txBody>
@@ -2536,109 +2296,42 @@
           <a:lstStyle>
             <a:lvl1pPr marL="0" indent="0">
               <a:buNone/>
-              <a:defRPr sz="3200"/>
+              <a:defRPr sz="4200"/>
             </a:lvl1pPr>
-            <a:lvl2pPr marL="457200" indent="0">
-              <a:buNone/>
-              <a:defRPr sz="2800"/>
+            <a:lvl2pPr marL="1200059" indent="0">
+              <a:buNone/>
+              <a:defRPr sz="3675"/>
             </a:lvl2pPr>
-            <a:lvl3pPr marL="914400" indent="0">
-              <a:buNone/>
-              <a:defRPr sz="2400"/>
+            <a:lvl3pPr marL="2400117" indent="0">
+              <a:buNone/>
+              <a:defRPr sz="3150"/>
             </a:lvl3pPr>
-            <a:lvl4pPr marL="1371600" indent="0">
-              <a:buNone/>
-              <a:defRPr sz="2000"/>
+            <a:lvl4pPr marL="3600176" indent="0">
+              <a:buNone/>
+              <a:defRPr sz="2625"/>
             </a:lvl4pPr>
-            <a:lvl5pPr marL="1828800" indent="0">
-              <a:buNone/>
-              <a:defRPr sz="2000"/>
+            <a:lvl5pPr marL="4800234" indent="0">
+              <a:buNone/>
+              <a:defRPr sz="2625"/>
             </a:lvl5pPr>
-            <a:lvl6pPr marL="2286000" indent="0">
-              <a:buNone/>
-              <a:defRPr sz="2000"/>
+            <a:lvl6pPr marL="6000293" indent="0">
+              <a:buNone/>
+              <a:defRPr sz="2625"/>
             </a:lvl6pPr>
-            <a:lvl7pPr marL="2743200" indent="0">
-              <a:buNone/>
-              <a:defRPr sz="2000"/>
+            <a:lvl7pPr marL="7200351" indent="0">
+              <a:buNone/>
+              <a:defRPr sz="2625"/>
             </a:lvl7pPr>
-            <a:lvl8pPr marL="3200400" indent="0">
-              <a:buNone/>
-              <a:defRPr sz="2000"/>
+            <a:lvl8pPr marL="8400410" indent="0">
+              <a:buNone/>
+              <a:defRPr sz="2625"/>
             </a:lvl8pPr>
-            <a:lvl9pPr marL="3657600" indent="0">
-              <a:buNone/>
-              <a:defRPr sz="2000"/>
+            <a:lvl9pPr marL="9600468" indent="0">
+              <a:buNone/>
+              <a:defRPr sz="2625"/>
             </a:lvl9pPr>
           </a:lstStyle>
           <a:p>
-            <a:endParaRPr lang="en-US"/>
-          </a:p>
-        </p:txBody>
-      </p:sp>
-      <p:sp>
-        <p:nvSpPr>
-          <p:cNvPr id="4" name="Text Placeholder 3">
-            <a:extLst>
-              <a:ext uri="{FF2B5EF4-FFF2-40B4-BE49-F238E27FC236}">
-                <a16:creationId xmlns:a16="http://schemas.microsoft.com/office/drawing/2014/main" id="{871BD53F-1719-45D1-AA21-D07BC42BB435}"/>
-              </a:ext>
-            </a:extLst>
-          </p:cNvPr>
-          <p:cNvSpPr>
-            <a:spLocks noGrp="1"/>
-          </p:cNvSpPr>
-          <p:nvPr>
-            <p:ph type="body" sz="half" idx="2"/>
-          </p:nvPr>
-        </p:nvSpPr>
-        <p:spPr>
-          <a:xfrm>
-            <a:off x="839788" y="2057400"/>
-            <a:ext cx="3932237" cy="3811588"/>
-          </a:xfrm>
-        </p:spPr>
-        <p:txBody>
-          <a:bodyPr/>
-          <a:lstStyle>
-            <a:lvl1pPr marL="0" indent="0">
-              <a:buNone/>
-              <a:defRPr sz="1600"/>
-            </a:lvl1pPr>
-            <a:lvl2pPr marL="457200" indent="0">
-              <a:buNone/>
-              <a:defRPr sz="1400"/>
-            </a:lvl2pPr>
-            <a:lvl3pPr marL="914400" indent="0">
-              <a:buNone/>
-              <a:defRPr sz="1200"/>
-            </a:lvl3pPr>
-            <a:lvl4pPr marL="1371600" indent="0">
-              <a:buNone/>
-              <a:defRPr sz="1000"/>
-            </a:lvl4pPr>
-            <a:lvl5pPr marL="1828800" indent="0">
-              <a:buNone/>
-              <a:defRPr sz="1000"/>
-            </a:lvl5pPr>
-            <a:lvl6pPr marL="2286000" indent="0">
-              <a:buNone/>
-              <a:defRPr sz="1000"/>
-            </a:lvl6pPr>
-            <a:lvl7pPr marL="2743200" indent="0">
-              <a:buNone/>
-              <a:defRPr sz="1000"/>
-            </a:lvl7pPr>
-            <a:lvl8pPr marL="3200400" indent="0">
-              <a:buNone/>
-              <a:defRPr sz="1000"/>
-            </a:lvl8pPr>
-            <a:lvl9pPr marL="3657600" indent="0">
-              <a:buNone/>
-              <a:defRPr sz="1000"/>
-            </a:lvl9pPr>
-          </a:lstStyle>
-          <a:p>
             <a:pPr lvl="0"/>
             <a:r>
               <a:rPr lang="en-US"/>
@@ -2649,13 +2342,7 @@
       </p:sp>
       <p:sp>
         <p:nvSpPr>
-          <p:cNvPr id="5" name="Date Placeholder 4">
-            <a:extLst>
-              <a:ext uri="{FF2B5EF4-FFF2-40B4-BE49-F238E27FC236}">
-                <a16:creationId xmlns:a16="http://schemas.microsoft.com/office/drawing/2014/main" id="{F397AC9D-9D74-4683-AE5E-3D86ECF1C70D}"/>
-              </a:ext>
-            </a:extLst>
-          </p:cNvPr>
+          <p:cNvPr id="5" name="Date Placeholder 4"/>
           <p:cNvSpPr>
             <a:spLocks noGrp="1"/>
           </p:cNvSpPr>
@@ -2670,7 +2357,7 @@
           <a:p>
             <a:fld id="{76ABEC16-1E1A-40CE-AB5F-E22D57C0F079}" type="datetimeFigureOut">
               <a:rPr lang="en-US" smtClean="0"/>
-              <a:t>9/3/2021</a:t>
+              <a:t>9/7/2021</a:t>
             </a:fld>
             <a:endParaRPr lang="en-US"/>
           </a:p>
@@ -2678,13 +2365,7 @@
       </p:sp>
       <p:sp>
         <p:nvSpPr>
-          <p:cNvPr id="6" name="Footer Placeholder 5">
-            <a:extLst>
-              <a:ext uri="{FF2B5EF4-FFF2-40B4-BE49-F238E27FC236}">
-                <a16:creationId xmlns:a16="http://schemas.microsoft.com/office/drawing/2014/main" id="{83791F4C-1A9D-4B0B-AF78-B4B3E28A9303}"/>
-              </a:ext>
-            </a:extLst>
-          </p:cNvPr>
+          <p:cNvPr id="6" name="Footer Placeholder 5"/>
           <p:cNvSpPr>
             <a:spLocks noGrp="1"/>
           </p:cNvSpPr>
@@ -2703,13 +2384,7 @@
       </p:sp>
       <p:sp>
         <p:nvSpPr>
-          <p:cNvPr id="7" name="Slide Number Placeholder 6">
-            <a:extLst>
-              <a:ext uri="{FF2B5EF4-FFF2-40B4-BE49-F238E27FC236}">
-                <a16:creationId xmlns:a16="http://schemas.microsoft.com/office/drawing/2014/main" id="{A9B4A788-A2D6-4E8D-8AB0-921343A4D626}"/>
-              </a:ext>
-            </a:extLst>
-          </p:cNvPr>
+          <p:cNvPr id="7" name="Slide Number Placeholder 6"/>
           <p:cNvSpPr>
             <a:spLocks noGrp="1"/>
           </p:cNvSpPr>
@@ -2733,7 +2408,7 @@
     </p:spTree>
     <p:extLst>
       <p:ext uri="{BB962C8B-B14F-4D97-AF65-F5344CB8AC3E}">
-        <p14:creationId xmlns:p14="http://schemas.microsoft.com/office/powerpoint/2010/main" val="3201744548"/>
+        <p14:creationId xmlns:p14="http://schemas.microsoft.com/office/powerpoint/2010/main" val="2375162841"/>
       </p:ext>
     </p:extLst>
   </p:cSld>
@@ -2767,13 +2442,7 @@
       </p:grpSpPr>
       <p:sp>
         <p:nvSpPr>
-          <p:cNvPr id="2" name="Title Placeholder 1">
-            <a:extLst>
-              <a:ext uri="{FF2B5EF4-FFF2-40B4-BE49-F238E27FC236}">
-                <a16:creationId xmlns:a16="http://schemas.microsoft.com/office/drawing/2014/main" id="{9DB1A4E0-AAD8-49EF-A027-F8A30FF3E102}"/>
-              </a:ext>
-            </a:extLst>
-          </p:cNvPr>
+          <p:cNvPr id="2" name="Title Placeholder 1"/>
           <p:cNvSpPr>
             <a:spLocks noGrp="1"/>
           </p:cNvSpPr>
@@ -2783,8 +2452,8 @@
         </p:nvSpPr>
         <p:spPr>
           <a:xfrm>
-            <a:off x="838200" y="365125"/>
-            <a:ext cx="10515600" cy="1325563"/>
+            <a:off x="2474982" y="958370"/>
+            <a:ext cx="31049774" cy="3479296"/>
           </a:xfrm>
           <a:prstGeom prst="rect">
             <a:avLst/>
@@ -2800,18 +2469,13 @@
               <a:rPr lang="en-US"/>
               <a:t>Click to edit Master title style</a:t>
             </a:r>
-          </a:p>
-        </p:txBody>
-      </p:sp>
-      <p:sp>
-        <p:nvSpPr>
-          <p:cNvPr id="3" name="Text Placeholder 2">
-            <a:extLst>
-              <a:ext uri="{FF2B5EF4-FFF2-40B4-BE49-F238E27FC236}">
-                <a16:creationId xmlns:a16="http://schemas.microsoft.com/office/drawing/2014/main" id="{3D49668C-77F2-4AA5-8115-FA2F46BD579D}"/>
-              </a:ext>
-            </a:extLst>
-          </p:cNvPr>
+            <a:endParaRPr lang="en-US" dirty="0"/>
+          </a:p>
+        </p:txBody>
+      </p:sp>
+      <p:sp>
+        <p:nvSpPr>
+          <p:cNvPr id="3" name="Text Placeholder 2"/>
           <p:cNvSpPr>
             <a:spLocks noGrp="1"/>
           </p:cNvSpPr>
@@ -2821,8 +2485,8 @@
         </p:nvSpPr>
         <p:spPr>
           <a:xfrm>
-            <a:off x="838200" y="1825625"/>
-            <a:ext cx="10515600" cy="4351338"/>
+            <a:off x="2474982" y="4791843"/>
+            <a:ext cx="31049774" cy="11421255"/>
           </a:xfrm>
           <a:prstGeom prst="rect">
             <a:avLst/>
@@ -2867,18 +2531,13 @@
               <a:rPr lang="en-US"/>
               <a:t>Fifth level</a:t>
             </a:r>
-          </a:p>
-        </p:txBody>
-      </p:sp>
-      <p:sp>
-        <p:nvSpPr>
-          <p:cNvPr id="4" name="Date Placeholder 3">
-            <a:extLst>
-              <a:ext uri="{FF2B5EF4-FFF2-40B4-BE49-F238E27FC236}">
-                <a16:creationId xmlns:a16="http://schemas.microsoft.com/office/drawing/2014/main" id="{C88C2A98-2DFC-4FBA-9E6B-9B166AE18B9B}"/>
-              </a:ext>
-            </a:extLst>
-          </p:cNvPr>
+            <a:endParaRPr lang="en-US" dirty="0"/>
+          </a:p>
+        </p:txBody>
+      </p:sp>
+      <p:sp>
+        <p:nvSpPr>
+          <p:cNvPr id="4" name="Date Placeholder 3"/>
           <p:cNvSpPr>
             <a:spLocks noGrp="1"/>
           </p:cNvSpPr>
@@ -2888,8 +2547,8 @@
         </p:nvSpPr>
         <p:spPr>
           <a:xfrm>
-            <a:off x="838200" y="6356350"/>
-            <a:ext cx="2743200" cy="365125"/>
+            <a:off x="2474982" y="16683949"/>
+            <a:ext cx="8099941" cy="958369"/>
           </a:xfrm>
           <a:prstGeom prst="rect">
             <a:avLst/>
@@ -2899,7 +2558,7 @@
           <a:bodyPr vert="horz" lIns="91440" tIns="45720" rIns="91440" bIns="45720" rtlCol="0" anchor="ctr"/>
           <a:lstStyle>
             <a:lvl1pPr algn="l">
-              <a:defRPr sz="1200">
+              <a:defRPr sz="3150">
                 <a:solidFill>
                   <a:schemeClr val="tx1">
                     <a:tint val="75000"/>
@@ -2911,7 +2570,7 @@
           <a:p>
             <a:fld id="{76ABEC16-1E1A-40CE-AB5F-E22D57C0F079}" type="datetimeFigureOut">
               <a:rPr lang="en-US" smtClean="0"/>
-              <a:t>9/3/2021</a:t>
+              <a:t>9/7/2021</a:t>
             </a:fld>
             <a:endParaRPr lang="en-US"/>
           </a:p>
@@ -2919,13 +2578,7 @@
       </p:sp>
       <p:sp>
         <p:nvSpPr>
-          <p:cNvPr id="5" name="Footer Placeholder 4">
-            <a:extLst>
-              <a:ext uri="{FF2B5EF4-FFF2-40B4-BE49-F238E27FC236}">
-                <a16:creationId xmlns:a16="http://schemas.microsoft.com/office/drawing/2014/main" id="{3E360157-6BC5-4629-9954-F5DCE5E7D6D8}"/>
-              </a:ext>
-            </a:extLst>
-          </p:cNvPr>
+          <p:cNvPr id="5" name="Footer Placeholder 4"/>
           <p:cNvSpPr>
             <a:spLocks noGrp="1"/>
           </p:cNvSpPr>
@@ -2935,8 +2588,8 @@
         </p:nvSpPr>
         <p:spPr>
           <a:xfrm>
-            <a:off x="4038600" y="6356350"/>
-            <a:ext cx="4114800" cy="365125"/>
+            <a:off x="11924913" y="16683949"/>
+            <a:ext cx="12149912" cy="958369"/>
           </a:xfrm>
           <a:prstGeom prst="rect">
             <a:avLst/>
@@ -2946,7 +2599,7 @@
           <a:bodyPr vert="horz" lIns="91440" tIns="45720" rIns="91440" bIns="45720" rtlCol="0" anchor="ctr"/>
           <a:lstStyle>
             <a:lvl1pPr algn="ctr">
-              <a:defRPr sz="1200">
+              <a:defRPr sz="3150">
                 <a:solidFill>
                   <a:schemeClr val="tx1">
                     <a:tint val="75000"/>
@@ -2962,13 +2615,7 @@
       </p:sp>
       <p:sp>
         <p:nvSpPr>
-          <p:cNvPr id="6" name="Slide Number Placeholder 5">
-            <a:extLst>
-              <a:ext uri="{FF2B5EF4-FFF2-40B4-BE49-F238E27FC236}">
-                <a16:creationId xmlns:a16="http://schemas.microsoft.com/office/drawing/2014/main" id="{BED3346E-2C68-4429-806F-305EEBB59049}"/>
-              </a:ext>
-            </a:extLst>
-          </p:cNvPr>
+          <p:cNvPr id="6" name="Slide Number Placeholder 5"/>
           <p:cNvSpPr>
             <a:spLocks noGrp="1"/>
           </p:cNvSpPr>
@@ -2978,8 +2625,8 @@
         </p:nvSpPr>
         <p:spPr>
           <a:xfrm>
-            <a:off x="8610600" y="6356350"/>
-            <a:ext cx="2743200" cy="365125"/>
+            <a:off x="25424815" y="16683949"/>
+            <a:ext cx="8099941" cy="958369"/>
           </a:xfrm>
           <a:prstGeom prst="rect">
             <a:avLst/>
@@ -2989,7 +2636,7 @@
           <a:bodyPr vert="horz" lIns="91440" tIns="45720" rIns="91440" bIns="45720" rtlCol="0" anchor="ctr"/>
           <a:lstStyle>
             <a:lvl1pPr algn="r">
-              <a:defRPr sz="1200">
+              <a:defRPr sz="3150">
                 <a:solidFill>
                   <a:schemeClr val="tx1">
                     <a:tint val="75000"/>
@@ -3010,27 +2657,27 @@
     </p:spTree>
     <p:extLst>
       <p:ext uri="{BB962C8B-B14F-4D97-AF65-F5344CB8AC3E}">
-        <p14:creationId xmlns:p14="http://schemas.microsoft.com/office/powerpoint/2010/main" val="513892163"/>
+        <p14:creationId xmlns:p14="http://schemas.microsoft.com/office/powerpoint/2010/main" val="2139417623"/>
       </p:ext>
     </p:extLst>
   </p:cSld>
   <p:clrMap bg1="lt1" tx1="dk1" bg2="lt2" tx2="dk2" accent1="accent1" accent2="accent2" accent3="accent3" accent4="accent4" accent5="accent5" accent6="accent6" hlink="hlink" folHlink="folHlink"/>
   <p:sldLayoutIdLst>
-    <p:sldLayoutId id="2147483649" r:id="rId1"/>
-    <p:sldLayoutId id="2147483650" r:id="rId2"/>
-    <p:sldLayoutId id="2147483651" r:id="rId3"/>
-    <p:sldLayoutId id="2147483652" r:id="rId4"/>
-    <p:sldLayoutId id="2147483653" r:id="rId5"/>
-    <p:sldLayoutId id="2147483654" r:id="rId6"/>
-    <p:sldLayoutId id="2147483655" r:id="rId7"/>
-    <p:sldLayoutId id="2147483656" r:id="rId8"/>
-    <p:sldLayoutId id="2147483657" r:id="rId9"/>
-    <p:sldLayoutId id="2147483658" r:id="rId10"/>
-    <p:sldLayoutId id="2147483659" r:id="rId11"/>
+    <p:sldLayoutId id="2147483661" r:id="rId1"/>
+    <p:sldLayoutId id="2147483662" r:id="rId2"/>
+    <p:sldLayoutId id="2147483663" r:id="rId3"/>
+    <p:sldLayoutId id="2147483664" r:id="rId4"/>
+    <p:sldLayoutId id="2147483665" r:id="rId5"/>
+    <p:sldLayoutId id="2147483666" r:id="rId6"/>
+    <p:sldLayoutId id="2147483667" r:id="rId7"/>
+    <p:sldLayoutId id="2147483668" r:id="rId8"/>
+    <p:sldLayoutId id="2147483669" r:id="rId9"/>
+    <p:sldLayoutId id="2147483670" r:id="rId10"/>
+    <p:sldLayoutId id="2147483671" r:id="rId11"/>
   </p:sldLayoutIdLst>
   <p:txStyles>
     <p:titleStyle>
-      <a:lvl1pPr algn="l" defTabSz="914400" rtl="0" eaLnBrk="1" latinLnBrk="0" hangingPunct="1">
+      <a:lvl1pPr algn="l" defTabSz="2400117" rtl="0" eaLnBrk="1" latinLnBrk="0" hangingPunct="1">
         <a:lnSpc>
           <a:spcPct val="90000"/>
         </a:lnSpc>
@@ -3038,7 +2685,7 @@
           <a:spcPct val="0"/>
         </a:spcBef>
         <a:buNone/>
-        <a:defRPr sz="4400" kern="1200">
+        <a:defRPr sz="11549" kern="1200">
           <a:solidFill>
             <a:schemeClr val="tx1"/>
           </a:solidFill>
@@ -3049,16 +2696,16 @@
       </a:lvl1pPr>
     </p:titleStyle>
     <p:bodyStyle>
-      <a:lvl1pPr marL="228600" indent="-228600" algn="l" defTabSz="914400" rtl="0" eaLnBrk="1" latinLnBrk="0" hangingPunct="1">
+      <a:lvl1pPr marL="600029" indent="-600029" algn="l" defTabSz="2400117" rtl="0" eaLnBrk="1" latinLnBrk="0" hangingPunct="1">
         <a:lnSpc>
           <a:spcPct val="90000"/>
         </a:lnSpc>
         <a:spcBef>
-          <a:spcPts val="1000"/>
+          <a:spcPts val="2625"/>
         </a:spcBef>
         <a:buFont typeface="Arial" panose="020B0604020202020204" pitchFamily="34" charset="0"/>
         <a:buChar char="•"/>
-        <a:defRPr sz="2800" kern="1200">
+        <a:defRPr sz="7349" kern="1200">
           <a:solidFill>
             <a:schemeClr val="tx1"/>
           </a:solidFill>
@@ -3067,16 +2714,16 @@
           <a:cs typeface="+mn-cs"/>
         </a:defRPr>
       </a:lvl1pPr>
-      <a:lvl2pPr marL="685800" indent="-228600" algn="l" defTabSz="914400" rtl="0" eaLnBrk="1" latinLnBrk="0" hangingPunct="1">
+      <a:lvl2pPr marL="1800088" indent="-600029" algn="l" defTabSz="2400117" rtl="0" eaLnBrk="1" latinLnBrk="0" hangingPunct="1">
         <a:lnSpc>
           <a:spcPct val="90000"/>
         </a:lnSpc>
         <a:spcBef>
-          <a:spcPts val="500"/>
+          <a:spcPts val="1312"/>
         </a:spcBef>
         <a:buFont typeface="Arial" panose="020B0604020202020204" pitchFamily="34" charset="0"/>
         <a:buChar char="•"/>
-        <a:defRPr sz="2400" kern="1200">
+        <a:defRPr sz="6300" kern="1200">
           <a:solidFill>
             <a:schemeClr val="tx1"/>
           </a:solidFill>
@@ -3085,16 +2732,16 @@
           <a:cs typeface="+mn-cs"/>
         </a:defRPr>
       </a:lvl2pPr>
-      <a:lvl3pPr marL="1143000" indent="-228600" algn="l" defTabSz="914400" rtl="0" eaLnBrk="1" latinLnBrk="0" hangingPunct="1">
+      <a:lvl3pPr marL="3000146" indent="-600029" algn="l" defTabSz="2400117" rtl="0" eaLnBrk="1" latinLnBrk="0" hangingPunct="1">
         <a:lnSpc>
           <a:spcPct val="90000"/>
         </a:lnSpc>
         <a:spcBef>
-          <a:spcPts val="500"/>
+          <a:spcPts val="1312"/>
         </a:spcBef>
         <a:buFont typeface="Arial" panose="020B0604020202020204" pitchFamily="34" charset="0"/>
         <a:buChar char="•"/>
-        <a:defRPr sz="2000" kern="1200">
+        <a:defRPr sz="5250" kern="1200">
           <a:solidFill>
             <a:schemeClr val="tx1"/>
           </a:solidFill>
@@ -3103,16 +2750,16 @@
           <a:cs typeface="+mn-cs"/>
         </a:defRPr>
       </a:lvl3pPr>
-      <a:lvl4pPr marL="1600200" indent="-228600" algn="l" defTabSz="914400" rtl="0" eaLnBrk="1" latinLnBrk="0" hangingPunct="1">
+      <a:lvl4pPr marL="4200205" indent="-600029" algn="l" defTabSz="2400117" rtl="0" eaLnBrk="1" latinLnBrk="0" hangingPunct="1">
         <a:lnSpc>
           <a:spcPct val="90000"/>
         </a:lnSpc>
         <a:spcBef>
-          <a:spcPts val="500"/>
+          <a:spcPts val="1312"/>
         </a:spcBef>
         <a:buFont typeface="Arial" panose="020B0604020202020204" pitchFamily="34" charset="0"/>
         <a:buChar char="•"/>
-        <a:defRPr sz="1800" kern="1200">
+        <a:defRPr sz="4725" kern="1200">
           <a:solidFill>
             <a:schemeClr val="tx1"/>
           </a:solidFill>
@@ -3121,16 +2768,16 @@
           <a:cs typeface="+mn-cs"/>
         </a:defRPr>
       </a:lvl4pPr>
-      <a:lvl5pPr marL="2057400" indent="-228600" algn="l" defTabSz="914400" rtl="0" eaLnBrk="1" latinLnBrk="0" hangingPunct="1">
+      <a:lvl5pPr marL="5400264" indent="-600029" algn="l" defTabSz="2400117" rtl="0" eaLnBrk="1" latinLnBrk="0" hangingPunct="1">
         <a:lnSpc>
           <a:spcPct val="90000"/>
         </a:lnSpc>
         <a:spcBef>
-          <a:spcPts val="500"/>
+          <a:spcPts val="1312"/>
         </a:spcBef>
         <a:buFont typeface="Arial" panose="020B0604020202020204" pitchFamily="34" charset="0"/>
         <a:buChar char="•"/>
-        <a:defRPr sz="1800" kern="1200">
+        <a:defRPr sz="4725" kern="1200">
           <a:solidFill>
             <a:schemeClr val="tx1"/>
           </a:solidFill>
@@ -3139,16 +2786,16 @@
           <a:cs typeface="+mn-cs"/>
         </a:defRPr>
       </a:lvl5pPr>
-      <a:lvl6pPr marL="2514600" indent="-228600" algn="l" defTabSz="914400" rtl="0" eaLnBrk="1" latinLnBrk="0" hangingPunct="1">
+      <a:lvl6pPr marL="6600322" indent="-600029" algn="l" defTabSz="2400117" rtl="0" eaLnBrk="1" latinLnBrk="0" hangingPunct="1">
         <a:lnSpc>
           <a:spcPct val="90000"/>
         </a:lnSpc>
         <a:spcBef>
-          <a:spcPts val="500"/>
+          <a:spcPts val="1312"/>
         </a:spcBef>
         <a:buFont typeface="Arial" panose="020B0604020202020204" pitchFamily="34" charset="0"/>
         <a:buChar char="•"/>
-        <a:defRPr sz="1800" kern="1200">
+        <a:defRPr sz="4725" kern="1200">
           <a:solidFill>
             <a:schemeClr val="tx1"/>
           </a:solidFill>
@@ -3157,16 +2804,16 @@
           <a:cs typeface="+mn-cs"/>
         </a:defRPr>
       </a:lvl6pPr>
-      <a:lvl7pPr marL="2971800" indent="-228600" algn="l" defTabSz="914400" rtl="0" eaLnBrk="1" latinLnBrk="0" hangingPunct="1">
+      <a:lvl7pPr marL="7800381" indent="-600029" algn="l" defTabSz="2400117" rtl="0" eaLnBrk="1" latinLnBrk="0" hangingPunct="1">
         <a:lnSpc>
           <a:spcPct val="90000"/>
         </a:lnSpc>
         <a:spcBef>
-          <a:spcPts val="500"/>
+          <a:spcPts val="1312"/>
         </a:spcBef>
         <a:buFont typeface="Arial" panose="020B0604020202020204" pitchFamily="34" charset="0"/>
         <a:buChar char="•"/>
-        <a:defRPr sz="1800" kern="1200">
+        <a:defRPr sz="4725" kern="1200">
           <a:solidFill>
             <a:schemeClr val="tx1"/>
           </a:solidFill>
@@ -3175,16 +2822,16 @@
           <a:cs typeface="+mn-cs"/>
         </a:defRPr>
       </a:lvl7pPr>
-      <a:lvl8pPr marL="3429000" indent="-228600" algn="l" defTabSz="914400" rtl="0" eaLnBrk="1" latinLnBrk="0" hangingPunct="1">
+      <a:lvl8pPr marL="9000439" indent="-600029" algn="l" defTabSz="2400117" rtl="0" eaLnBrk="1" latinLnBrk="0" hangingPunct="1">
         <a:lnSpc>
           <a:spcPct val="90000"/>
         </a:lnSpc>
         <a:spcBef>
-          <a:spcPts val="500"/>
+          <a:spcPts val="1312"/>
         </a:spcBef>
         <a:buFont typeface="Arial" panose="020B0604020202020204" pitchFamily="34" charset="0"/>
         <a:buChar char="•"/>
-        <a:defRPr sz="1800" kern="1200">
+        <a:defRPr sz="4725" kern="1200">
           <a:solidFill>
             <a:schemeClr val="tx1"/>
           </a:solidFill>
@@ -3193,16 +2840,16 @@
           <a:cs typeface="+mn-cs"/>
         </a:defRPr>
       </a:lvl8pPr>
-      <a:lvl9pPr marL="3886200" indent="-228600" algn="l" defTabSz="914400" rtl="0" eaLnBrk="1" latinLnBrk="0" hangingPunct="1">
+      <a:lvl9pPr marL="10200498" indent="-600029" algn="l" defTabSz="2400117" rtl="0" eaLnBrk="1" latinLnBrk="0" hangingPunct="1">
         <a:lnSpc>
           <a:spcPct val="90000"/>
         </a:lnSpc>
         <a:spcBef>
-          <a:spcPts val="500"/>
+          <a:spcPts val="1312"/>
         </a:spcBef>
         <a:buFont typeface="Arial" panose="020B0604020202020204" pitchFamily="34" charset="0"/>
         <a:buChar char="•"/>
-        <a:defRPr sz="1800" kern="1200">
+        <a:defRPr sz="4725" kern="1200">
           <a:solidFill>
             <a:schemeClr val="tx1"/>
           </a:solidFill>
@@ -3216,8 +2863,8 @@
       <a:defPPr>
         <a:defRPr lang="en-US"/>
       </a:defPPr>
-      <a:lvl1pPr marL="0" algn="l" defTabSz="914400" rtl="0" eaLnBrk="1" latinLnBrk="0" hangingPunct="1">
-        <a:defRPr sz="1800" kern="1200">
+      <a:lvl1pPr marL="0" algn="l" defTabSz="2400117" rtl="0" eaLnBrk="1" latinLnBrk="0" hangingPunct="1">
+        <a:defRPr sz="4725" kern="1200">
           <a:solidFill>
             <a:schemeClr val="tx1"/>
           </a:solidFill>
@@ -3226,8 +2873,8 @@
           <a:cs typeface="+mn-cs"/>
         </a:defRPr>
       </a:lvl1pPr>
-      <a:lvl2pPr marL="457200" algn="l" defTabSz="914400" rtl="0" eaLnBrk="1" latinLnBrk="0" hangingPunct="1">
-        <a:defRPr sz="1800" kern="1200">
+      <a:lvl2pPr marL="1200059" algn="l" defTabSz="2400117" rtl="0" eaLnBrk="1" latinLnBrk="0" hangingPunct="1">
+        <a:defRPr sz="4725" kern="1200">
           <a:solidFill>
             <a:schemeClr val="tx1"/>
           </a:solidFill>
@@ -3236,8 +2883,8 @@
           <a:cs typeface="+mn-cs"/>
         </a:defRPr>
       </a:lvl2pPr>
-      <a:lvl3pPr marL="914400" algn="l" defTabSz="914400" rtl="0" eaLnBrk="1" latinLnBrk="0" hangingPunct="1">
-        <a:defRPr sz="1800" kern="1200">
+      <a:lvl3pPr marL="2400117" algn="l" defTabSz="2400117" rtl="0" eaLnBrk="1" latinLnBrk="0" hangingPunct="1">
+        <a:defRPr sz="4725" kern="1200">
           <a:solidFill>
             <a:schemeClr val="tx1"/>
           </a:solidFill>
@@ -3246,8 +2893,8 @@
           <a:cs typeface="+mn-cs"/>
         </a:defRPr>
       </a:lvl3pPr>
-      <a:lvl4pPr marL="1371600" algn="l" defTabSz="914400" rtl="0" eaLnBrk="1" latinLnBrk="0" hangingPunct="1">
-        <a:defRPr sz="1800" kern="1200">
+      <a:lvl4pPr marL="3600176" algn="l" defTabSz="2400117" rtl="0" eaLnBrk="1" latinLnBrk="0" hangingPunct="1">
+        <a:defRPr sz="4725" kern="1200">
           <a:solidFill>
             <a:schemeClr val="tx1"/>
           </a:solidFill>
@@ -3256,8 +2903,8 @@
           <a:cs typeface="+mn-cs"/>
         </a:defRPr>
       </a:lvl4pPr>
-      <a:lvl5pPr marL="1828800" algn="l" defTabSz="914400" rtl="0" eaLnBrk="1" latinLnBrk="0" hangingPunct="1">
-        <a:defRPr sz="1800" kern="1200">
+      <a:lvl5pPr marL="4800234" algn="l" defTabSz="2400117" rtl="0" eaLnBrk="1" latinLnBrk="0" hangingPunct="1">
+        <a:defRPr sz="4725" kern="1200">
           <a:solidFill>
             <a:schemeClr val="tx1"/>
           </a:solidFill>
@@ -3266,8 +2913,8 @@
           <a:cs typeface="+mn-cs"/>
         </a:defRPr>
       </a:lvl5pPr>
-      <a:lvl6pPr marL="2286000" algn="l" defTabSz="914400" rtl="0" eaLnBrk="1" latinLnBrk="0" hangingPunct="1">
-        <a:defRPr sz="1800" kern="1200">
+      <a:lvl6pPr marL="6000293" algn="l" defTabSz="2400117" rtl="0" eaLnBrk="1" latinLnBrk="0" hangingPunct="1">
+        <a:defRPr sz="4725" kern="1200">
           <a:solidFill>
             <a:schemeClr val="tx1"/>
           </a:solidFill>
@@ -3276,8 +2923,8 @@
           <a:cs typeface="+mn-cs"/>
         </a:defRPr>
       </a:lvl6pPr>
-      <a:lvl7pPr marL="2743200" algn="l" defTabSz="914400" rtl="0" eaLnBrk="1" latinLnBrk="0" hangingPunct="1">
-        <a:defRPr sz="1800" kern="1200">
+      <a:lvl7pPr marL="7200351" algn="l" defTabSz="2400117" rtl="0" eaLnBrk="1" latinLnBrk="0" hangingPunct="1">
+        <a:defRPr sz="4725" kern="1200">
           <a:solidFill>
             <a:schemeClr val="tx1"/>
           </a:solidFill>
@@ -3286,8 +2933,8 @@
           <a:cs typeface="+mn-cs"/>
         </a:defRPr>
       </a:lvl7pPr>
-      <a:lvl8pPr marL="3200400" algn="l" defTabSz="914400" rtl="0" eaLnBrk="1" latinLnBrk="0" hangingPunct="1">
-        <a:defRPr sz="1800" kern="1200">
+      <a:lvl8pPr marL="8400410" algn="l" defTabSz="2400117" rtl="0" eaLnBrk="1" latinLnBrk="0" hangingPunct="1">
+        <a:defRPr sz="4725" kern="1200">
           <a:solidFill>
             <a:schemeClr val="tx1"/>
           </a:solidFill>
@@ -3296,8 +2943,8 @@
           <a:cs typeface="+mn-cs"/>
         </a:defRPr>
       </a:lvl8pPr>
-      <a:lvl9pPr marL="3657600" algn="l" defTabSz="914400" rtl="0" eaLnBrk="1" latinLnBrk="0" hangingPunct="1">
-        <a:defRPr sz="1800" kern="1200">
+      <a:lvl9pPr marL="9600468" algn="l" defTabSz="2400117" rtl="0" eaLnBrk="1" latinLnBrk="0" hangingPunct="1">
+        <a:defRPr sz="4725" kern="1200">
           <a:solidFill>
             <a:schemeClr val="tx1"/>
           </a:solidFill>
@@ -3352,8 +2999,8 @@
         </p:nvSpPr>
         <p:spPr>
           <a:xfrm>
-            <a:off x="0" y="1628511"/>
-            <a:ext cx="12192000" cy="2185214"/>
+            <a:off x="1999280" y="4274438"/>
+            <a:ext cx="32001178" cy="5735737"/>
           </a:xfrm>
           <a:prstGeom prst="rect">
             <a:avLst/>
@@ -3375,7 +3022,7 @@
           <a:p>
             <a:pPr algn="ctr"/>
             <a:r>
-              <a:rPr lang="en-US" sz="11000" b="1" dirty="0">
+              <a:rPr lang="en-US" sz="28873" b="1" dirty="0">
                 <a:solidFill>
                   <a:schemeClr val="bg1"/>
                 </a:solidFill>
@@ -3394,7 +3041,7 @@
           <a:p>
             <a:pPr algn="ctr"/>
             <a:r>
-              <a:rPr lang="en-US" sz="3200" b="1" i="0" dirty="0">
+              <a:rPr lang="en-US" sz="8399" b="1" dirty="0">
                 <a:solidFill>
                   <a:schemeClr val="bg1"/>
                 </a:solidFill>
@@ -3409,7 +3056,7 @@
               </a:rPr>
               <a:t>MỘT DANH HIỆU BẠN KHÔNG NÊN BỎ LỠ THỜI SINH VIÊN</a:t>
             </a:r>
-            <a:endParaRPr lang="en-US" sz="9600" b="1" dirty="0">
+            <a:endParaRPr lang="en-US" sz="25198" b="1" dirty="0">
               <a:solidFill>
                 <a:schemeClr val="bg1"/>
               </a:solidFill>
@@ -3439,6 +3086,368 @@
 </file>
 
 <file path=ppt/slides/slide2.xml><?xml version="1.0" encoding="utf-8"?>
+<p:sld xmlns:a="http://schemas.openxmlformats.org/drawingml/2006/main" xmlns:r="http://schemas.openxmlformats.org/officeDocument/2006/relationships" xmlns:p="http://schemas.openxmlformats.org/presentationml/2006/main">
+  <p:cSld>
+    <p:bg>
+      <p:bgPr>
+        <a:solidFill>
+          <a:srgbClr val="002060"/>
+        </a:solidFill>
+        <a:effectLst/>
+      </p:bgPr>
+    </p:bg>
+    <p:spTree>
+      <p:nvGrpSpPr>
+        <p:cNvPr id="1" name=""/>
+        <p:cNvGrpSpPr/>
+        <p:nvPr/>
+      </p:nvGrpSpPr>
+      <p:grpSpPr>
+        <a:xfrm>
+          <a:off x="0" y="0"/>
+          <a:ext cx="0" cy="0"/>
+          <a:chOff x="0" y="0"/>
+          <a:chExt cx="0" cy="0"/>
+        </a:xfrm>
+      </p:grpSpPr>
+      <p:grpSp>
+        <p:nvGrpSpPr>
+          <p:cNvPr id="27" name="Group 26">
+            <a:extLst>
+              <a:ext uri="{FF2B5EF4-FFF2-40B4-BE49-F238E27FC236}">
+                <a16:creationId xmlns:a16="http://schemas.microsoft.com/office/drawing/2014/main" id="{273B05B8-70E0-4AC0-BAAB-A0FFD9B1EA1C}"/>
+              </a:ext>
+            </a:extLst>
+          </p:cNvPr>
+          <p:cNvGrpSpPr/>
+          <p:nvPr/>
+        </p:nvGrpSpPr>
+        <p:grpSpPr>
+          <a:xfrm>
+            <a:off x="4346267" y="5106064"/>
+            <a:ext cx="27858494" cy="2880000"/>
+            <a:chOff x="4346267" y="5106064"/>
+            <a:chExt cx="27858494" cy="2880000"/>
+          </a:xfrm>
+        </p:grpSpPr>
+        <p:sp>
+          <p:nvSpPr>
+            <p:cNvPr id="15" name="TextBox 14">
+              <a:extLst>
+                <a:ext uri="{FF2B5EF4-FFF2-40B4-BE49-F238E27FC236}">
+                  <a16:creationId xmlns:a16="http://schemas.microsoft.com/office/drawing/2014/main" id="{0EB1FC8C-A48D-490E-828D-407601E66BF1}"/>
+                </a:ext>
+              </a:extLst>
+            </p:cNvPr>
+            <p:cNvSpPr txBox="1"/>
+            <p:nvPr/>
+          </p:nvSpPr>
+          <p:spPr>
+            <a:xfrm>
+              <a:off x="4346267" y="5106064"/>
+              <a:ext cx="27858494" cy="2880000"/>
+            </a:xfrm>
+            <a:prstGeom prst="rect">
+              <a:avLst/>
+            </a:prstGeom>
+            <a:noFill/>
+          </p:spPr>
+          <p:txBody>
+            <a:bodyPr wrap="square" rtlCol="0">
+              <a:spAutoFit/>
+            </a:bodyPr>
+            <a:lstStyle/>
+            <a:p>
+              <a:endParaRPr lang="en-US" dirty="0"/>
+            </a:p>
+          </p:txBody>
+        </p:sp>
+        <p:grpSp>
+          <p:nvGrpSpPr>
+            <p:cNvPr id="24" name="Group 23">
+              <a:extLst>
+                <a:ext uri="{FF2B5EF4-FFF2-40B4-BE49-F238E27FC236}">
+                  <a16:creationId xmlns:a16="http://schemas.microsoft.com/office/drawing/2014/main" id="{07430BA7-4074-4F4E-931F-45B607772066}"/>
+                </a:ext>
+              </a:extLst>
+            </p:cNvPr>
+            <p:cNvGrpSpPr/>
+            <p:nvPr/>
+          </p:nvGrpSpPr>
+          <p:grpSpPr>
+            <a:xfrm>
+              <a:off x="10666835" y="5466065"/>
+              <a:ext cx="15243582" cy="2160000"/>
+              <a:chOff x="10666835" y="5466065"/>
+              <a:chExt cx="15243582" cy="2160000"/>
+            </a:xfrm>
+          </p:grpSpPr>
+          <p:pic>
+            <p:nvPicPr>
+              <p:cNvPr id="3" name="Picture 2" descr="Logo&#10;&#10;Description automatically generated">
+                <a:extLst>
+                  <a:ext uri="{FF2B5EF4-FFF2-40B4-BE49-F238E27FC236}">
+                    <a16:creationId xmlns:a16="http://schemas.microsoft.com/office/drawing/2014/main" id="{A7693AE1-5D9B-4B6C-A6FA-68CCECBDAF30}"/>
+                  </a:ext>
+                </a:extLst>
+              </p:cNvPr>
+              <p:cNvPicPr>
+                <a:picLocks noChangeAspect="1"/>
+              </p:cNvPicPr>
+              <p:nvPr/>
+            </p:nvPicPr>
+            <p:blipFill>
+              <a:blip r:embed="rId2">
+                <a:extLst>
+                  <a:ext uri="{28A0092B-C50C-407E-A947-70E740481C1C}">
+                    <a14:useLocalDpi xmlns:a14="http://schemas.microsoft.com/office/drawing/2010/main" val="0"/>
+                  </a:ext>
+                </a:extLst>
+              </a:blip>
+              <a:stretch>
+                <a:fillRect/>
+              </a:stretch>
+            </p:blipFill>
+            <p:spPr>
+              <a:xfrm>
+                <a:off x="10666835" y="5466065"/>
+                <a:ext cx="1703929" cy="2160000"/>
+              </a:xfrm>
+              <a:prstGeom prst="rect">
+                <a:avLst/>
+              </a:prstGeom>
+              <a:effectLst>
+                <a:outerShdw blurRad="127000" dist="50800" dir="2700000" sx="102000" sy="102000" algn="tl" rotWithShape="0">
+                  <a:srgbClr val="00B0F0">
+                    <a:alpha val="40000"/>
+                  </a:srgbClr>
+                </a:outerShdw>
+              </a:effectLst>
+            </p:spPr>
+          </p:pic>
+          <p:pic>
+            <p:nvPicPr>
+              <p:cNvPr id="5" name="Picture 4">
+                <a:extLst>
+                  <a:ext uri="{FF2B5EF4-FFF2-40B4-BE49-F238E27FC236}">
+                    <a16:creationId xmlns:a16="http://schemas.microsoft.com/office/drawing/2014/main" id="{2A05067B-ACA1-4BBE-87AD-EA5CB601EE4E}"/>
+                  </a:ext>
+                </a:extLst>
+              </p:cNvPr>
+              <p:cNvPicPr>
+                <a:picLocks noChangeAspect="1"/>
+              </p:cNvPicPr>
+              <p:nvPr/>
+            </p:nvPicPr>
+            <p:blipFill>
+              <a:blip r:embed="rId3">
+                <a:extLst>
+                  <a:ext uri="{28A0092B-C50C-407E-A947-70E740481C1C}">
+                    <a14:useLocalDpi xmlns:a14="http://schemas.microsoft.com/office/drawing/2010/main" val="0"/>
+                  </a:ext>
+                </a:extLst>
+              </a:blip>
+              <a:srcRect/>
+              <a:stretch/>
+            </p:blipFill>
+            <p:spPr>
+              <a:xfrm>
+                <a:off x="13514599" y="5466065"/>
+                <a:ext cx="2637274" cy="2160000"/>
+              </a:xfrm>
+              <a:prstGeom prst="rect">
+                <a:avLst/>
+              </a:prstGeom>
+              <a:effectLst>
+                <a:outerShdw blurRad="127000" dist="50800" dir="2700000" sx="102000" sy="102000" algn="tl" rotWithShape="0">
+                  <a:srgbClr val="00B0F0">
+                    <a:alpha val="40000"/>
+                  </a:srgbClr>
+                </a:outerShdw>
+              </a:effectLst>
+            </p:spPr>
+          </p:pic>
+          <p:pic>
+            <p:nvPicPr>
+              <p:cNvPr id="7" name="Picture 6" descr="Logo&#10;&#10;Description automatically generated">
+                <a:extLst>
+                  <a:ext uri="{FF2B5EF4-FFF2-40B4-BE49-F238E27FC236}">
+                    <a16:creationId xmlns:a16="http://schemas.microsoft.com/office/drawing/2014/main" id="{7177F9F8-70B9-4FE6-A8C5-FAABC9186F57}"/>
+                  </a:ext>
+                </a:extLst>
+              </p:cNvPr>
+              <p:cNvPicPr>
+                <a:picLocks noChangeAspect="1"/>
+              </p:cNvPicPr>
+              <p:nvPr/>
+            </p:nvPicPr>
+            <p:blipFill>
+              <a:blip r:embed="rId4">
+                <a:extLst>
+                  <a:ext uri="{28A0092B-C50C-407E-A947-70E740481C1C}">
+                    <a14:useLocalDpi xmlns:a14="http://schemas.microsoft.com/office/drawing/2010/main" val="0"/>
+                  </a:ext>
+                </a:extLst>
+              </a:blip>
+              <a:stretch>
+                <a:fillRect/>
+              </a:stretch>
+            </p:blipFill>
+            <p:spPr>
+              <a:xfrm>
+                <a:off x="20399155" y="5466065"/>
+                <a:ext cx="2160000" cy="2160000"/>
+              </a:xfrm>
+              <a:prstGeom prst="rect">
+                <a:avLst/>
+              </a:prstGeom>
+              <a:effectLst>
+                <a:outerShdw blurRad="127000" dist="50800" dir="2700000" sx="102000" sy="102000" algn="tl" rotWithShape="0">
+                  <a:srgbClr val="00B0F0">
+                    <a:alpha val="40000"/>
+                  </a:srgbClr>
+                </a:outerShdw>
+              </a:effectLst>
+            </p:spPr>
+          </p:pic>
+          <p:pic>
+            <p:nvPicPr>
+              <p:cNvPr id="9" name="Picture 8" descr="Logo&#10;&#10;Description automatically generated">
+                <a:extLst>
+                  <a:ext uri="{FF2B5EF4-FFF2-40B4-BE49-F238E27FC236}">
+                    <a16:creationId xmlns:a16="http://schemas.microsoft.com/office/drawing/2014/main" id="{9AED9489-6291-44A4-A915-31A5A3BAC79D}"/>
+                  </a:ext>
+                </a:extLst>
+              </p:cNvPr>
+              <p:cNvPicPr>
+                <a:picLocks noChangeAspect="1"/>
+              </p:cNvPicPr>
+              <p:nvPr/>
+            </p:nvPicPr>
+            <p:blipFill>
+              <a:blip r:embed="rId5">
+                <a:extLst>
+                  <a:ext uri="{28A0092B-C50C-407E-A947-70E740481C1C}">
+                    <a14:useLocalDpi xmlns:a14="http://schemas.microsoft.com/office/drawing/2010/main" val="0"/>
+                  </a:ext>
+                </a:extLst>
+              </a:blip>
+              <a:stretch>
+                <a:fillRect/>
+              </a:stretch>
+            </p:blipFill>
+            <p:spPr>
+              <a:xfrm>
+                <a:off x="23702992" y="5466065"/>
+                <a:ext cx="2207425" cy="2160000"/>
+              </a:xfrm>
+              <a:prstGeom prst="rect">
+                <a:avLst/>
+              </a:prstGeom>
+              <a:effectLst>
+                <a:outerShdw blurRad="127000" dist="50800" dir="2700000" sx="102000" sy="102000" algn="tl" rotWithShape="0">
+                  <a:srgbClr val="00B0F0">
+                    <a:alpha val="40000"/>
+                  </a:srgbClr>
+                </a:outerShdw>
+              </a:effectLst>
+            </p:spPr>
+          </p:pic>
+          <p:pic>
+            <p:nvPicPr>
+              <p:cNvPr id="11" name="Picture 10" descr="Logo&#10;&#10;Description automatically generated">
+                <a:extLst>
+                  <a:ext uri="{FF2B5EF4-FFF2-40B4-BE49-F238E27FC236}">
+                    <a16:creationId xmlns:a16="http://schemas.microsoft.com/office/drawing/2014/main" id="{EC198B54-3E06-4E9D-B07A-EE8499CE0C9D}"/>
+                  </a:ext>
+                </a:extLst>
+              </p:cNvPr>
+              <p:cNvPicPr>
+                <a:picLocks noChangeAspect="1"/>
+              </p:cNvPicPr>
+              <p:nvPr/>
+            </p:nvPicPr>
+            <p:blipFill>
+              <a:blip r:embed="rId6">
+                <a:extLst>
+                  <a:ext uri="{28A0092B-C50C-407E-A947-70E740481C1C}">
+                    <a14:useLocalDpi xmlns:a14="http://schemas.microsoft.com/office/drawing/2010/main" val="0"/>
+                  </a:ext>
+                </a:extLst>
+              </a:blip>
+              <a:stretch>
+                <a:fillRect/>
+              </a:stretch>
+            </p:blipFill>
+            <p:spPr>
+              <a:xfrm>
+                <a:off x="17295709" y="5466065"/>
+                <a:ext cx="1959611" cy="2160000"/>
+              </a:xfrm>
+              <a:prstGeom prst="rect">
+                <a:avLst/>
+              </a:prstGeom>
+              <a:effectLst>
+                <a:outerShdw blurRad="127000" dist="50800" dir="2700000" sx="102000" sy="102000" algn="tl" rotWithShape="0">
+                  <a:srgbClr val="00B0F0">
+                    <a:alpha val="40000"/>
+                  </a:srgbClr>
+                </a:outerShdw>
+              </a:effectLst>
+            </p:spPr>
+          </p:pic>
+        </p:grpSp>
+      </p:grpSp>
+      <p:pic>
+        <p:nvPicPr>
+          <p:cNvPr id="21" name="Picture 20" descr="Logo&#10;&#10;Description automatically generated">
+            <a:extLst>
+              <a:ext uri="{FF2B5EF4-FFF2-40B4-BE49-F238E27FC236}">
+                <a16:creationId xmlns:a16="http://schemas.microsoft.com/office/drawing/2014/main" id="{0B63C064-7FC2-4908-A55D-7F56F43EB860}"/>
+              </a:ext>
+            </a:extLst>
+          </p:cNvPr>
+          <p:cNvPicPr>
+            <a:picLocks noChangeAspect="1"/>
+          </p:cNvPicPr>
+          <p:nvPr/>
+        </p:nvPicPr>
+        <p:blipFill>
+          <a:blip r:embed="rId7">
+            <a:extLst>
+              <a:ext uri="{28A0092B-C50C-407E-A947-70E740481C1C}">
+                <a14:useLocalDpi xmlns:a14="http://schemas.microsoft.com/office/drawing/2010/main" val="0"/>
+              </a:ext>
+            </a:extLst>
+          </a:blip>
+          <a:stretch>
+            <a:fillRect/>
+          </a:stretch>
+        </p:blipFill>
+        <p:spPr>
+          <a:xfrm>
+            <a:off x="12272383" y="10014598"/>
+            <a:ext cx="6636852" cy="5435767"/>
+          </a:xfrm>
+          <a:prstGeom prst="rect">
+            <a:avLst/>
+          </a:prstGeom>
+        </p:spPr>
+      </p:pic>
+    </p:spTree>
+    <p:extLst>
+      <p:ext uri="{BB962C8B-B14F-4D97-AF65-F5344CB8AC3E}">
+        <p14:creationId xmlns:p14="http://schemas.microsoft.com/office/powerpoint/2010/main" val="1690020587"/>
+      </p:ext>
+    </p:extLst>
+  </p:cSld>
+  <p:clrMapOvr>
+    <a:masterClrMapping/>
+  </p:clrMapOvr>
+</p:sld>
+</file>
+
+<file path=ppt/slides/slide3.xml><?xml version="1.0" encoding="utf-8"?>
 <p:sld xmlns:a="http://schemas.openxmlformats.org/drawingml/2006/main" xmlns:r="http://schemas.openxmlformats.org/officeDocument/2006/relationships" xmlns:p="http://schemas.openxmlformats.org/presentationml/2006/main">
   <p:cSld>
     <p:spTree>
@@ -3469,8 +3478,8 @@
         </p:nvGrpSpPr>
         <p:grpSpPr>
           <a:xfrm>
-            <a:off x="0" y="462386"/>
-            <a:ext cx="12192000" cy="6021988"/>
+            <a:off x="1999280" y="1213656"/>
+            <a:ext cx="32001178" cy="15806325"/>
             <a:chOff x="0" y="857109"/>
             <a:chExt cx="12192000" cy="6021988"/>
           </a:xfrm>
@@ -3490,7 +3499,7 @@
           <p:spPr>
             <a:xfrm>
               <a:off x="0" y="857109"/>
-              <a:ext cx="12192000" cy="707886"/>
+              <a:ext cx="12192000" cy="650736"/>
             </a:xfrm>
             <a:prstGeom prst="rect">
               <a:avLst/>
@@ -3505,7 +3514,7 @@
             <a:p>
               <a:pPr algn="ctr"/>
               <a:r>
-                <a:rPr lang="en-US" sz="4000" dirty="0">
+                <a:rPr lang="en-US" sz="10499" dirty="0">
                   <a:solidFill>
                     <a:srgbClr val="CC5B4B"/>
                   </a:solidFill>
@@ -3533,7 +3542,7 @@
               <p:spPr>
                 <a:xfrm>
                   <a:off x="0" y="2041190"/>
-                  <a:ext cx="12192000" cy="1127809"/>
+                  <a:ext cx="12192000" cy="1127881"/>
                 </a:xfrm>
                 <a:prstGeom prst="rect">
                   <a:avLst/>
@@ -3554,15 +3563,13 @@
                       </m:oMathParaPr>
                       <m:oMath xmlns:m="http://schemas.openxmlformats.org/officeDocument/2006/math">
                         <m:r>
-                          <a:rPr lang="en-US" sz="3600" b="1" i="1" smtClean="0">
-                            <a:effectLst/>
+                          <a:rPr lang="en-US" sz="9449" b="1" i="1">
                             <a:latin typeface="Cambria Math" panose="02040503050406030204" pitchFamily="18" charset="0"/>
                           </a:rPr>
                           <m:t>𝑫𝑻𝑩</m:t>
                         </m:r>
                         <m:r>
-                          <a:rPr lang="en-US" sz="3600" b="1" i="1" smtClean="0">
-                            <a:effectLst/>
+                          <a:rPr lang="en-US" sz="9449" b="1" i="1">
                             <a:latin typeface="Cambria Math" panose="02040503050406030204" pitchFamily="18" charset="0"/>
                           </a:rPr>
                           <m:t>=</m:t>
@@ -3570,8 +3577,7 @@
                         <m:f>
                           <m:fPr>
                             <m:ctrlPr>
-                              <a:rPr lang="en-US" sz="3600" b="1" i="1" smtClean="0">
-                                <a:effectLst/>
+                              <a:rPr lang="en-US" sz="9449" b="1" i="1">
                                 <a:latin typeface="Cambria Math" panose="02040503050406030204" pitchFamily="18" charset="0"/>
                               </a:rPr>
                             </m:ctrlPr>
@@ -3580,16 +3586,14 @@
                             <m:sSub>
                               <m:sSubPr>
                                 <m:ctrlPr>
-                                  <a:rPr lang="en-US" sz="3600" b="1" i="1" smtClean="0">
-                                    <a:effectLst/>
+                                  <a:rPr lang="en-US" sz="9449" b="1" i="1">
                                     <a:latin typeface="Cambria Math" panose="02040503050406030204" pitchFamily="18" charset="0"/>
                                   </a:rPr>
                                 </m:ctrlPr>
                               </m:sSubPr>
                               <m:e>
                                 <m:r>
-                                  <a:rPr lang="en-US" sz="3600" b="1" i="1" smtClean="0">
-                                    <a:effectLst/>
+                                  <a:rPr lang="en-US" sz="9449" b="1" i="1">
                                     <a:latin typeface="Cambria Math" panose="02040503050406030204" pitchFamily="18" charset="0"/>
                                   </a:rPr>
                                   <m:t>𝑿</m:t>
@@ -3597,8 +3601,7 @@
                               </m:e>
                               <m:sub>
                                 <m:r>
-                                  <a:rPr lang="en-US" sz="3600" b="1" i="1" smtClean="0">
-                                    <a:effectLst/>
+                                  <a:rPr lang="en-US" sz="9449" b="1" i="1">
                                     <a:latin typeface="Cambria Math" panose="02040503050406030204" pitchFamily="18" charset="0"/>
                                   </a:rPr>
                                   <m:t>𝟏</m:t>
@@ -3606,8 +3609,7 @@
                               </m:sub>
                             </m:sSub>
                             <m:r>
-                              <a:rPr lang="en-US" sz="3600" b="1" i="1" smtClean="0">
-                                <a:effectLst/>
+                              <a:rPr lang="en-US" sz="9449" b="1" i="1">
                                 <a:latin typeface="Cambria Math" panose="02040503050406030204" pitchFamily="18" charset="0"/>
                               </a:rPr>
                               <m:t>.</m:t>
@@ -3615,16 +3617,14 @@
                             <m:sSub>
                               <m:sSubPr>
                                 <m:ctrlPr>
-                                  <a:rPr lang="en-US" sz="3600" b="1" i="1" smtClean="0">
-                                    <a:effectLst/>
+                                  <a:rPr lang="en-US" sz="9449" b="1" i="1">
                                     <a:latin typeface="Cambria Math" panose="02040503050406030204" pitchFamily="18" charset="0"/>
                                   </a:rPr>
                                 </m:ctrlPr>
                               </m:sSubPr>
                               <m:e>
                                 <m:r>
-                                  <a:rPr lang="en-US" sz="3600" b="1" i="1" smtClean="0">
-                                    <a:effectLst/>
+                                  <a:rPr lang="en-US" sz="9449" b="1" i="1">
                                     <a:latin typeface="Cambria Math" panose="02040503050406030204" pitchFamily="18" charset="0"/>
                                   </a:rPr>
                                   <m:t>𝒏</m:t>
@@ -3632,8 +3632,7 @@
                               </m:e>
                               <m:sub>
                                 <m:r>
-                                  <a:rPr lang="en-US" sz="3600" b="1" i="1" smtClean="0">
-                                    <a:effectLst/>
+                                  <a:rPr lang="en-US" sz="9449" b="1" i="1">
                                     <a:latin typeface="Cambria Math" panose="02040503050406030204" pitchFamily="18" charset="0"/>
                                   </a:rPr>
                                   <m:t>𝟏</m:t>
@@ -3641,8 +3640,7 @@
                               </m:sub>
                             </m:sSub>
                             <m:r>
-                              <a:rPr lang="en-US" sz="3600" b="1" i="1" smtClean="0">
-                                <a:effectLst/>
+                              <a:rPr lang="en-US" sz="9449" b="1" i="1">
                                 <a:latin typeface="Cambria Math" panose="02040503050406030204" pitchFamily="18" charset="0"/>
                               </a:rPr>
                               <m:t>+</m:t>
@@ -3650,16 +3648,14 @@
                             <m:sSub>
                               <m:sSubPr>
                                 <m:ctrlPr>
-                                  <a:rPr lang="en-US" sz="3600" b="1" i="1" smtClean="0">
-                                    <a:effectLst/>
+                                  <a:rPr lang="en-US" sz="9449" b="1" i="1">
                                     <a:latin typeface="Cambria Math" panose="02040503050406030204" pitchFamily="18" charset="0"/>
                                   </a:rPr>
                                 </m:ctrlPr>
                               </m:sSubPr>
                               <m:e>
                                 <m:r>
-                                  <a:rPr lang="en-US" sz="3600" b="1" i="1" smtClean="0">
-                                    <a:effectLst/>
+                                  <a:rPr lang="en-US" sz="9449" b="1" i="1">
                                     <a:latin typeface="Cambria Math" panose="02040503050406030204" pitchFamily="18" charset="0"/>
                                   </a:rPr>
                                   <m:t>𝑿</m:t>
@@ -3667,8 +3663,7 @@
                               </m:e>
                               <m:sub>
                                 <m:r>
-                                  <a:rPr lang="en-US" sz="3600" b="1" i="1" smtClean="0">
-                                    <a:effectLst/>
+                                  <a:rPr lang="en-US" sz="9449" b="1" i="1">
                                     <a:latin typeface="Cambria Math" panose="02040503050406030204" pitchFamily="18" charset="0"/>
                                   </a:rPr>
                                   <m:t>𝟐</m:t>
@@ -3676,8 +3671,7 @@
                               </m:sub>
                             </m:sSub>
                             <m:r>
-                              <a:rPr lang="en-US" sz="3600" b="1" i="1" smtClean="0">
-                                <a:effectLst/>
+                              <a:rPr lang="en-US" sz="9449" b="1" i="1">
                                 <a:latin typeface="Cambria Math" panose="02040503050406030204" pitchFamily="18" charset="0"/>
                               </a:rPr>
                               <m:t>.</m:t>
@@ -3685,16 +3679,14 @@
                             <m:sSub>
                               <m:sSubPr>
                                 <m:ctrlPr>
-                                  <a:rPr lang="en-US" sz="3600" b="1" i="1" smtClean="0">
-                                    <a:effectLst/>
+                                  <a:rPr lang="en-US" sz="9449" b="1" i="1">
                                     <a:latin typeface="Cambria Math" panose="02040503050406030204" pitchFamily="18" charset="0"/>
                                   </a:rPr>
                                 </m:ctrlPr>
                               </m:sSubPr>
                               <m:e>
                                 <m:r>
-                                  <a:rPr lang="en-US" sz="3600" b="1" i="1" smtClean="0">
-                                    <a:effectLst/>
+                                  <a:rPr lang="en-US" sz="9449" b="1" i="1">
                                     <a:latin typeface="Cambria Math" panose="02040503050406030204" pitchFamily="18" charset="0"/>
                                   </a:rPr>
                                   <m:t>𝒏</m:t>
@@ -3702,8 +3694,7 @@
                               </m:e>
                               <m:sub>
                                 <m:r>
-                                  <a:rPr lang="en-US" sz="3600" b="1" i="1" smtClean="0">
-                                    <a:effectLst/>
+                                  <a:rPr lang="en-US" sz="9449" b="1" i="1">
                                     <a:latin typeface="Cambria Math" panose="02040503050406030204" pitchFamily="18" charset="0"/>
                                   </a:rPr>
                                   <m:t>𝟐</m:t>
@@ -3711,8 +3702,7 @@
                               </m:sub>
                             </m:sSub>
                             <m:r>
-                              <a:rPr lang="en-US" sz="3600" b="1" i="1" smtClean="0">
-                                <a:effectLst/>
+                              <a:rPr lang="en-US" sz="9449" b="1" i="1">
                                 <a:latin typeface="Cambria Math" panose="02040503050406030204" pitchFamily="18" charset="0"/>
                               </a:rPr>
                               <m:t>+…+</m:t>
@@ -3720,16 +3710,14 @@
                             <m:sSub>
                               <m:sSubPr>
                                 <m:ctrlPr>
-                                  <a:rPr lang="en-US" sz="3600" b="1" i="1" smtClean="0">
-                                    <a:effectLst/>
+                                  <a:rPr lang="en-US" sz="9449" b="1" i="1">
                                     <a:latin typeface="Cambria Math" panose="02040503050406030204" pitchFamily="18" charset="0"/>
                                   </a:rPr>
                                 </m:ctrlPr>
                               </m:sSubPr>
                               <m:e>
                                 <m:r>
-                                  <a:rPr lang="en-US" sz="3600" b="1" i="1" smtClean="0">
-                                    <a:effectLst/>
+                                  <a:rPr lang="en-US" sz="9449" b="1" i="1">
                                     <a:latin typeface="Cambria Math" panose="02040503050406030204" pitchFamily="18" charset="0"/>
                                   </a:rPr>
                                   <m:t>𝑿</m:t>
@@ -3737,8 +3725,7 @@
                               </m:e>
                               <m:sub>
                                 <m:r>
-                                  <a:rPr lang="en-US" sz="3600" b="1" i="1" smtClean="0">
-                                    <a:effectLst/>
+                                  <a:rPr lang="en-US" sz="9449" b="1" i="1">
                                     <a:latin typeface="Cambria Math" panose="02040503050406030204" pitchFamily="18" charset="0"/>
                                   </a:rPr>
                                   <m:t>𝒛</m:t>
@@ -3746,8 +3733,7 @@
                               </m:sub>
                             </m:sSub>
                             <m:r>
-                              <a:rPr lang="en-US" sz="3600" b="1" i="1" smtClean="0">
-                                <a:effectLst/>
+                              <a:rPr lang="en-US" sz="9449" b="1" i="1">
                                 <a:latin typeface="Cambria Math" panose="02040503050406030204" pitchFamily="18" charset="0"/>
                               </a:rPr>
                               <m:t>.</m:t>
@@ -3755,16 +3741,14 @@
                             <m:sSub>
                               <m:sSubPr>
                                 <m:ctrlPr>
-                                  <a:rPr lang="en-US" sz="3600" b="1" i="1" smtClean="0">
-                                    <a:effectLst/>
+                                  <a:rPr lang="en-US" sz="9449" b="1" i="1">
                                     <a:latin typeface="Cambria Math" panose="02040503050406030204" pitchFamily="18" charset="0"/>
                                   </a:rPr>
                                 </m:ctrlPr>
                               </m:sSubPr>
                               <m:e>
                                 <m:r>
-                                  <a:rPr lang="en-US" sz="3600" b="1" i="1" smtClean="0">
-                                    <a:effectLst/>
+                                  <a:rPr lang="en-US" sz="9449" b="1" i="1">
                                     <a:latin typeface="Cambria Math" panose="02040503050406030204" pitchFamily="18" charset="0"/>
                                   </a:rPr>
                                   <m:t>𝒏</m:t>
@@ -3772,8 +3756,7 @@
                               </m:e>
                               <m:sub>
                                 <m:r>
-                                  <a:rPr lang="en-US" sz="3600" b="1" i="1" smtClean="0">
-                                    <a:effectLst/>
+                                  <a:rPr lang="en-US" sz="9449" b="1" i="1">
                                     <a:latin typeface="Cambria Math" panose="02040503050406030204" pitchFamily="18" charset="0"/>
                                   </a:rPr>
                                   <m:t>𝒛</m:t>
@@ -3785,16 +3768,14 @@
                             <m:sSub>
                               <m:sSubPr>
                                 <m:ctrlPr>
-                                  <a:rPr lang="en-US" sz="3600" b="1" i="1" smtClean="0">
-                                    <a:effectLst/>
+                                  <a:rPr lang="en-US" sz="9449" b="1" i="1">
                                     <a:latin typeface="Cambria Math" panose="02040503050406030204" pitchFamily="18" charset="0"/>
                                   </a:rPr>
                                 </m:ctrlPr>
                               </m:sSubPr>
                               <m:e>
                                 <m:r>
-                                  <a:rPr lang="en-US" sz="3600" b="1" i="1" smtClean="0">
-                                    <a:effectLst/>
+                                  <a:rPr lang="en-US" sz="9449" b="1" i="1">
                                     <a:latin typeface="Cambria Math" panose="02040503050406030204" pitchFamily="18" charset="0"/>
                                   </a:rPr>
                                   <m:t>𝒏</m:t>
@@ -3802,8 +3783,7 @@
                               </m:e>
                               <m:sub>
                                 <m:r>
-                                  <a:rPr lang="en-US" sz="3600" b="1" i="1" smtClean="0">
-                                    <a:effectLst/>
+                                  <a:rPr lang="en-US" sz="9449" b="1" i="1">
                                     <a:latin typeface="Cambria Math" panose="02040503050406030204" pitchFamily="18" charset="0"/>
                                   </a:rPr>
                                   <m:t>𝟏</m:t>
@@ -3811,8 +3791,7 @@
                               </m:sub>
                             </m:sSub>
                             <m:r>
-                              <a:rPr lang="en-US" sz="3600" b="1" i="1" smtClean="0">
-                                <a:effectLst/>
+                              <a:rPr lang="en-US" sz="9449" b="1" i="1">
                                 <a:latin typeface="Cambria Math" panose="02040503050406030204" pitchFamily="18" charset="0"/>
                               </a:rPr>
                               <m:t>+</m:t>
@@ -3820,16 +3799,14 @@
                             <m:sSub>
                               <m:sSubPr>
                                 <m:ctrlPr>
-                                  <a:rPr lang="en-US" sz="3600" b="1" i="1" smtClean="0">
-                                    <a:effectLst/>
+                                  <a:rPr lang="en-US" sz="9449" b="1" i="1">
                                     <a:latin typeface="Cambria Math" panose="02040503050406030204" pitchFamily="18" charset="0"/>
                                   </a:rPr>
                                 </m:ctrlPr>
                               </m:sSubPr>
                               <m:e>
                                 <m:r>
-                                  <a:rPr lang="en-US" sz="3600" b="1" i="1" smtClean="0">
-                                    <a:effectLst/>
+                                  <a:rPr lang="en-US" sz="9449" b="1" i="1">
                                     <a:latin typeface="Cambria Math" panose="02040503050406030204" pitchFamily="18" charset="0"/>
                                   </a:rPr>
                                   <m:t>𝒏</m:t>
@@ -3837,8 +3814,7 @@
                               </m:e>
                               <m:sub>
                                 <m:r>
-                                  <a:rPr lang="en-US" sz="3600" b="1" i="1" smtClean="0">
-                                    <a:effectLst/>
+                                  <a:rPr lang="en-US" sz="9449" b="1" i="1">
                                     <a:latin typeface="Cambria Math" panose="02040503050406030204" pitchFamily="18" charset="0"/>
                                   </a:rPr>
                                   <m:t>𝟐</m:t>
@@ -3846,8 +3822,7 @@
                               </m:sub>
                             </m:sSub>
                             <m:r>
-                              <a:rPr lang="en-US" sz="3600" b="1" i="1" smtClean="0">
-                                <a:effectLst/>
+                              <a:rPr lang="en-US" sz="9449" b="1" i="1">
                                 <a:latin typeface="Cambria Math" panose="02040503050406030204" pitchFamily="18" charset="0"/>
                               </a:rPr>
                               <m:t>+…+</m:t>
@@ -3855,16 +3830,14 @@
                             <m:sSub>
                               <m:sSubPr>
                                 <m:ctrlPr>
-                                  <a:rPr lang="en-US" sz="3600" b="1" i="1" smtClean="0">
-                                    <a:effectLst/>
+                                  <a:rPr lang="en-US" sz="9449" b="1" i="1">
                                     <a:latin typeface="Cambria Math" panose="02040503050406030204" pitchFamily="18" charset="0"/>
                                   </a:rPr>
                                 </m:ctrlPr>
                               </m:sSubPr>
                               <m:e>
                                 <m:r>
-                                  <a:rPr lang="en-US" sz="3600" b="1" i="1" smtClean="0">
-                                    <a:effectLst/>
+                                  <a:rPr lang="en-US" sz="9449" b="1" i="1">
                                     <a:latin typeface="Cambria Math" panose="02040503050406030204" pitchFamily="18" charset="0"/>
                                   </a:rPr>
                                   <m:t>𝒏</m:t>
@@ -3872,8 +3845,7 @@
                               </m:e>
                               <m:sub>
                                 <m:r>
-                                  <a:rPr lang="en-US" sz="3600" b="1" i="1" smtClean="0">
-                                    <a:effectLst/>
+                                  <a:rPr lang="en-US" sz="9449" b="1" i="1">
                                     <a:latin typeface="Cambria Math" panose="02040503050406030204" pitchFamily="18" charset="0"/>
                                   </a:rPr>
                                   <m:t>𝒛</m:t>
@@ -3885,9 +3857,7 @@
                       </m:oMath>
                     </m:oMathPara>
                   </a14:m>
-                  <a:endParaRPr lang="en-US" sz="3600" b="1" dirty="0">
-                    <a:effectLst/>
-                  </a:endParaRPr>
+                  <a:endParaRPr lang="en-US" sz="9449" b="1" dirty="0"/>
                 </a:p>
               </p:txBody>
             </p:sp>
@@ -3910,7 +3880,7 @@
               <p:spPr>
                 <a:xfrm>
                   <a:off x="0" y="2041190"/>
-                  <a:ext cx="12192000" cy="1127809"/>
+                  <a:ext cx="12192000" cy="1127881"/>
                 </a:xfrm>
                 <a:prstGeom prst="rect">
                   <a:avLst/>
@@ -3952,7 +3922,7 @@
           <p:spPr>
             <a:xfrm>
               <a:off x="570274" y="4006530"/>
-              <a:ext cx="7128386" cy="2308324"/>
+              <a:ext cx="7128386" cy="2251364"/>
             </a:xfrm>
             <a:prstGeom prst="rect">
               <a:avLst/>
@@ -3967,7 +3937,7 @@
             <a:p>
               <a:pPr algn="just"/>
               <a:r>
-                <a:rPr lang="en-US" sz="2400" b="1" dirty="0">
+                <a:rPr lang="en-US" sz="6300" b="1" dirty="0">
                   <a:solidFill>
                     <a:schemeClr val="bg1"/>
                   </a:solidFill>
@@ -3978,7 +3948,7 @@
                 <a:t> </a:t>
               </a:r>
               <a:r>
-                <a:rPr lang="en-US" sz="2400" b="1" dirty="0" err="1">
+                <a:rPr lang="en-US" sz="6300" b="1" dirty="0" err="1">
                   <a:solidFill>
                     <a:schemeClr val="bg1"/>
                   </a:solidFill>
@@ -3989,7 +3959,7 @@
                 <a:t>Trong</a:t>
               </a:r>
               <a:r>
-                <a:rPr lang="en-US" sz="2400" b="1" dirty="0">
+                <a:rPr lang="en-US" sz="6300" b="1" dirty="0">
                   <a:solidFill>
                     <a:schemeClr val="bg1"/>
                   </a:solidFill>
@@ -4000,7 +3970,7 @@
                 <a:t> </a:t>
               </a:r>
               <a:r>
-                <a:rPr lang="en-US" sz="2400" b="1" dirty="0" err="1">
+                <a:rPr lang="en-US" sz="6300" b="1" dirty="0" err="1">
                   <a:solidFill>
                     <a:schemeClr val="bg1"/>
                   </a:solidFill>
@@ -4011,7 +3981,7 @@
                 <a:t>đó</a:t>
               </a:r>
               <a:r>
-                <a:rPr lang="en-US" sz="2400" b="1" dirty="0">
+                <a:rPr lang="en-US" sz="6300" b="1" dirty="0">
                   <a:solidFill>
                     <a:schemeClr val="bg1"/>
                   </a:solidFill>
@@ -4022,7 +3992,7 @@
                 <a:t>:</a:t>
               </a:r>
               <a:r>
-                <a:rPr lang="en-US" sz="2400" b="1" dirty="0">
+                <a:rPr lang="en-US" sz="6300" b="1" dirty="0">
                   <a:solidFill>
                     <a:schemeClr val="bg1"/>
                   </a:solidFill>
@@ -4030,7 +4000,7 @@
                 <a:t> </a:t>
               </a:r>
               <a:r>
-                <a:rPr lang="en-US" sz="2400" b="1" dirty="0">
+                <a:rPr lang="en-US" sz="6300" b="1" dirty="0">
                   <a:solidFill>
                     <a:schemeClr val="bg1"/>
                   </a:solidFill>
@@ -4042,151 +4012,151 @@
               </a:r>
             </a:p>
             <a:p>
-              <a:pPr marL="541338" indent="-285750" algn="just">
+              <a:pPr marL="1420904" indent="-750037" algn="just">
                 <a:buFont typeface="Wingdings" panose="05000000000000000000" pitchFamily="2" charset="2"/>
                 <a:buChar char="§"/>
               </a:pPr>
               <a:r>
-                <a:rPr lang="en-US" sz="2400" b="1" dirty="0"/>
+                <a:rPr lang="en-US" sz="6300" b="1" dirty="0"/>
                 <a:t>X</a:t>
               </a:r>
               <a:r>
-                <a:rPr lang="en-US" sz="2400" b="1" baseline="-25000" dirty="0"/>
+                <a:rPr lang="en-US" sz="6300" b="1" baseline="-25000" dirty="0"/>
                 <a:t>i</a:t>
               </a:r>
               <a:r>
-                <a:rPr lang="en-US" sz="2400" b="1" dirty="0"/>
-                <a:t> </a:t>
-              </a:r>
-              <a:r>
-                <a:rPr lang="en-US" sz="2400" b="1" dirty="0" err="1"/>
+                <a:rPr lang="en-US" sz="6300" b="1" dirty="0"/>
+                <a:t> </a:t>
+              </a:r>
+              <a:r>
+                <a:rPr lang="en-US" sz="6300" b="1" dirty="0" err="1"/>
                 <a:t>là</a:t>
               </a:r>
               <a:r>
-                <a:rPr lang="en-US" sz="2400" b="1" dirty="0"/>
-                <a:t> </a:t>
-              </a:r>
-              <a:r>
-                <a:rPr lang="en-US" sz="2400" b="1" dirty="0" err="1"/>
+                <a:rPr lang="en-US" sz="6300" b="1" dirty="0"/>
+                <a:t> </a:t>
+              </a:r>
+              <a:r>
+                <a:rPr lang="en-US" sz="6300" b="1" dirty="0" err="1"/>
                 <a:t>điểm</a:t>
               </a:r>
               <a:r>
-                <a:rPr lang="en-US" sz="2400" b="1" dirty="0"/>
-                <a:t> </a:t>
-              </a:r>
-              <a:r>
-                <a:rPr lang="en-US" sz="2400" b="1" dirty="0" err="1"/>
+                <a:rPr lang="en-US" sz="6300" b="1" dirty="0"/>
+                <a:t> </a:t>
+              </a:r>
+              <a:r>
+                <a:rPr lang="en-US" sz="6300" b="1" dirty="0" err="1"/>
                 <a:t>của</a:t>
               </a:r>
               <a:r>
-                <a:rPr lang="en-US" sz="2400" b="1" dirty="0"/>
-                <a:t> </a:t>
-              </a:r>
-              <a:r>
-                <a:rPr lang="en-US" sz="2400" b="1" dirty="0" err="1"/>
+                <a:rPr lang="en-US" sz="6300" b="1" dirty="0"/>
+                <a:t> </a:t>
+              </a:r>
+              <a:r>
+                <a:rPr lang="en-US" sz="6300" b="1" dirty="0" err="1"/>
                 <a:t>môn</a:t>
               </a:r>
               <a:r>
-                <a:rPr lang="en-US" sz="2400" b="1" dirty="0"/>
-                <a:t> </a:t>
-              </a:r>
-              <a:r>
-                <a:rPr lang="en-US" sz="2400" b="1" dirty="0" err="1"/>
+                <a:rPr lang="en-US" sz="6300" b="1" dirty="0"/>
+                <a:t> </a:t>
+              </a:r>
+              <a:r>
+                <a:rPr lang="en-US" sz="6300" b="1" dirty="0" err="1"/>
                 <a:t>thứ</a:t>
               </a:r>
               <a:r>
-                <a:rPr lang="en-US" sz="2400" b="1" dirty="0"/>
-                <a:t> </a:t>
-              </a:r>
-              <a:r>
-                <a:rPr lang="en-US" sz="2400" b="1" dirty="0" err="1"/>
+                <a:rPr lang="en-US" sz="6300" b="1" dirty="0"/>
+                <a:t> </a:t>
+              </a:r>
+              <a:r>
+                <a:rPr lang="en-US" sz="6300" b="1" dirty="0" err="1"/>
                 <a:t>i</a:t>
               </a:r>
-              <a:endParaRPr lang="en-US" sz="2400" b="1" dirty="0"/>
+              <a:endParaRPr lang="en-US" sz="6300" b="1" dirty="0"/>
             </a:p>
             <a:p>
-              <a:pPr marL="541338" indent="-285750" algn="just">
+              <a:pPr marL="1420904" indent="-750037" algn="just">
                 <a:buFont typeface="Wingdings" panose="05000000000000000000" pitchFamily="2" charset="2"/>
                 <a:buChar char="§"/>
               </a:pPr>
               <a:r>
-                <a:rPr lang="en-US" sz="2400" b="1" dirty="0" err="1"/>
+                <a:rPr lang="en-US" sz="6300" b="1" dirty="0" err="1"/>
                 <a:t>n</a:t>
               </a:r>
               <a:r>
-                <a:rPr lang="en-US" sz="2400" b="1" baseline="-25000" dirty="0" err="1"/>
+                <a:rPr lang="en-US" sz="6300" b="1" baseline="-25000" dirty="0" err="1"/>
                 <a:t>i</a:t>
               </a:r>
               <a:r>
-                <a:rPr lang="en-US" sz="2400" b="1" dirty="0"/>
-                <a:t> </a:t>
-              </a:r>
-              <a:r>
-                <a:rPr lang="en-US" sz="2400" b="1" dirty="0" err="1"/>
+                <a:rPr lang="en-US" sz="6300" b="1" dirty="0"/>
+                <a:t> </a:t>
+              </a:r>
+              <a:r>
+                <a:rPr lang="en-US" sz="6300" b="1" dirty="0" err="1"/>
                 <a:t>là</a:t>
               </a:r>
               <a:r>
-                <a:rPr lang="en-US" sz="2400" b="1" dirty="0"/>
-                <a:t> </a:t>
-              </a:r>
-              <a:r>
-                <a:rPr lang="en-US" sz="2400" b="1" dirty="0" err="1"/>
+                <a:rPr lang="en-US" sz="6300" b="1" dirty="0"/>
+                <a:t> </a:t>
+              </a:r>
+              <a:r>
+                <a:rPr lang="en-US" sz="6300" b="1" dirty="0" err="1"/>
                 <a:t>số</a:t>
               </a:r>
               <a:r>
-                <a:rPr lang="en-US" sz="2400" b="1" dirty="0"/>
-                <a:t> </a:t>
-              </a:r>
-              <a:r>
-                <a:rPr lang="en-US" sz="2400" b="1" dirty="0" err="1"/>
+                <a:rPr lang="en-US" sz="6300" b="1" dirty="0"/>
+                <a:t> </a:t>
+              </a:r>
+              <a:r>
+                <a:rPr lang="en-US" sz="6300" b="1" dirty="0" err="1"/>
                 <a:t>tín</a:t>
               </a:r>
               <a:r>
-                <a:rPr lang="en-US" sz="2400" b="1" dirty="0"/>
-                <a:t> </a:t>
-              </a:r>
-              <a:r>
-                <a:rPr lang="en-US" sz="2400" b="1" dirty="0" err="1"/>
+                <a:rPr lang="en-US" sz="6300" b="1" dirty="0"/>
+                <a:t> </a:t>
+              </a:r>
+              <a:r>
+                <a:rPr lang="en-US" sz="6300" b="1" dirty="0" err="1"/>
                 <a:t>chỉ</a:t>
               </a:r>
               <a:r>
-                <a:rPr lang="en-US" sz="2400" b="1" dirty="0"/>
-                <a:t> </a:t>
-              </a:r>
-              <a:r>
-                <a:rPr lang="en-US" sz="2400" b="1" dirty="0" err="1"/>
+                <a:rPr lang="en-US" sz="6300" b="1" dirty="0"/>
+                <a:t> </a:t>
+              </a:r>
+              <a:r>
+                <a:rPr lang="en-US" sz="6300" b="1" dirty="0" err="1"/>
                 <a:t>của</a:t>
               </a:r>
               <a:r>
-                <a:rPr lang="en-US" sz="2400" b="1" dirty="0"/>
-                <a:t> </a:t>
-              </a:r>
-              <a:r>
-                <a:rPr lang="en-US" sz="2400" b="1" dirty="0" err="1"/>
+                <a:rPr lang="en-US" sz="6300" b="1" dirty="0"/>
+                <a:t> </a:t>
+              </a:r>
+              <a:r>
+                <a:rPr lang="en-US" sz="6300" b="1" dirty="0" err="1"/>
                 <a:t>môn</a:t>
               </a:r>
               <a:r>
-                <a:rPr lang="en-US" sz="2400" b="1" dirty="0"/>
-                <a:t> </a:t>
-              </a:r>
-              <a:r>
-                <a:rPr lang="en-US" sz="2400" b="1" dirty="0" err="1"/>
+                <a:rPr lang="en-US" sz="6300" b="1" dirty="0"/>
+                <a:t> </a:t>
+              </a:r>
+              <a:r>
+                <a:rPr lang="en-US" sz="6300" b="1" dirty="0" err="1"/>
                 <a:t>thứ</a:t>
               </a:r>
               <a:r>
-                <a:rPr lang="en-US" sz="2400" b="1" dirty="0"/>
-                <a:t> </a:t>
-              </a:r>
-              <a:r>
-                <a:rPr lang="en-US" sz="2400" b="1" dirty="0" err="1"/>
+                <a:rPr lang="en-US" sz="6300" b="1" dirty="0"/>
+                <a:t> </a:t>
+              </a:r>
+              <a:r>
+                <a:rPr lang="en-US" sz="6300" b="1" dirty="0" err="1"/>
                 <a:t>i</a:t>
               </a:r>
-              <a:endParaRPr lang="en-US" sz="2400" b="1" dirty="0"/>
+              <a:endParaRPr lang="en-US" sz="6300" b="1" dirty="0"/>
             </a:p>
             <a:p>
               <a:pPr algn="just"/>
               <a:r>
-                <a:rPr lang="en-US" sz="2400" b="1" dirty="0">
+                <a:rPr lang="en-US" sz="6300" b="1" dirty="0">
                   <a:solidFill>
                     <a:schemeClr val="bg1"/>
                   </a:solidFill>
@@ -4197,7 +4167,7 @@
                 <a:t> </a:t>
               </a:r>
               <a:r>
-                <a:rPr lang="en-US" sz="2400" b="1" dirty="0" err="1">
+                <a:rPr lang="en-US" sz="6300" b="1" dirty="0" err="1">
                   <a:solidFill>
                     <a:schemeClr val="bg1"/>
                   </a:solidFill>
@@ -4208,7 +4178,7 @@
                 <a:t>Lưu</a:t>
               </a:r>
               <a:r>
-                <a:rPr lang="en-US" sz="2400" b="1" dirty="0">
+                <a:rPr lang="en-US" sz="6300" b="1" dirty="0">
                   <a:solidFill>
                     <a:schemeClr val="bg1"/>
                   </a:solidFill>
@@ -4219,279 +4189,279 @@
                 <a:t> ý: </a:t>
               </a:r>
               <a:r>
-                <a:rPr lang="en-US" sz="2400" dirty="0"/>
-                <a:t> </a:t>
-              </a:r>
-              <a:r>
-                <a:rPr lang="en-US" sz="2400" dirty="0" err="1"/>
+                <a:rPr lang="en-US" sz="6300" dirty="0"/>
+                <a:t> </a:t>
+              </a:r>
+              <a:r>
+                <a:rPr lang="en-US" sz="6300" dirty="0" err="1"/>
                 <a:t>nếu</a:t>
               </a:r>
               <a:r>
-                <a:rPr lang="en-US" sz="2400" dirty="0"/>
-                <a:t> </a:t>
-              </a:r>
-              <a:r>
-                <a:rPr lang="en-US" sz="2400" dirty="0" err="1"/>
+                <a:rPr lang="en-US" sz="6300" dirty="0"/>
+                <a:t> </a:t>
+              </a:r>
+              <a:r>
+                <a:rPr lang="en-US" sz="6300" dirty="0" err="1"/>
                 <a:t>trong</a:t>
               </a:r>
               <a:r>
-                <a:rPr lang="en-US" sz="2400" dirty="0"/>
-                <a:t> </a:t>
-              </a:r>
-              <a:r>
-                <a:rPr lang="en-US" sz="2400" dirty="0" err="1"/>
+                <a:rPr lang="en-US" sz="6300" dirty="0"/>
+                <a:t> </a:t>
+              </a:r>
+              <a:r>
+                <a:rPr lang="en-US" sz="6300" dirty="0" err="1"/>
                 <a:t>năm</a:t>
               </a:r>
               <a:r>
-                <a:rPr lang="en-US" sz="2400" dirty="0"/>
-                <a:t> </a:t>
-              </a:r>
-              <a:r>
-                <a:rPr lang="en-US" sz="2400" dirty="0" err="1"/>
+                <a:rPr lang="en-US" sz="6300" dirty="0"/>
+                <a:t> </a:t>
+              </a:r>
+              <a:r>
+                <a:rPr lang="en-US" sz="6300" dirty="0" err="1"/>
                 <a:t>học</a:t>
               </a:r>
               <a:r>
-                <a:rPr lang="en-US" sz="2400" dirty="0"/>
-                <a:t> </a:t>
-              </a:r>
-              <a:r>
-                <a:rPr lang="en-US" sz="2400" dirty="0" err="1"/>
+                <a:rPr lang="en-US" sz="6300" dirty="0"/>
+                <a:t> </a:t>
+              </a:r>
+              <a:r>
+                <a:rPr lang="en-US" sz="6300" dirty="0" err="1"/>
                 <a:t>có</a:t>
               </a:r>
               <a:r>
-                <a:rPr lang="en-US" sz="2400" dirty="0"/>
-                <a:t> </a:t>
-              </a:r>
-              <a:r>
-                <a:rPr lang="en-US" sz="2400" dirty="0" err="1"/>
+                <a:rPr lang="en-US" sz="6300" dirty="0"/>
+                <a:t> </a:t>
+              </a:r>
+              <a:r>
+                <a:rPr lang="en-US" sz="6300" dirty="0" err="1"/>
                 <a:t>rớt</a:t>
               </a:r>
               <a:r>
-                <a:rPr lang="en-US" sz="2400" dirty="0"/>
-                <a:t> </a:t>
-              </a:r>
-              <a:r>
-                <a:rPr lang="en-US" sz="2400" dirty="0" err="1"/>
+                <a:rPr lang="en-US" sz="6300" dirty="0"/>
+                <a:t> </a:t>
+              </a:r>
+              <a:r>
+                <a:rPr lang="en-US" sz="6300" dirty="0" err="1"/>
                 <a:t>môn</a:t>
               </a:r>
               <a:r>
-                <a:rPr lang="en-US" sz="2400" dirty="0"/>
-                <a:t> </a:t>
-              </a:r>
-              <a:r>
-                <a:rPr lang="en-US" sz="2400" dirty="0" err="1"/>
+                <a:rPr lang="en-US" sz="6300" dirty="0"/>
+                <a:t> </a:t>
+              </a:r>
+              <a:r>
+                <a:rPr lang="en-US" sz="6300" dirty="0" err="1"/>
                 <a:t>và</a:t>
               </a:r>
               <a:r>
-                <a:rPr lang="en-US" sz="2400" dirty="0"/>
-                <a:t> </a:t>
-              </a:r>
-              <a:r>
-                <a:rPr lang="en-US" sz="2400" dirty="0" err="1"/>
+                <a:rPr lang="en-US" sz="6300" dirty="0"/>
+                <a:t> </a:t>
+              </a:r>
+              <a:r>
+                <a:rPr lang="en-US" sz="6300" dirty="0" err="1"/>
                 <a:t>đã</a:t>
               </a:r>
               <a:r>
-                <a:rPr lang="en-US" sz="2400" dirty="0"/>
-                <a:t> </a:t>
-              </a:r>
-              <a:r>
-                <a:rPr lang="en-US" sz="2400" dirty="0" err="1"/>
+                <a:rPr lang="en-US" sz="6300" dirty="0"/>
+                <a:t> </a:t>
+              </a:r>
+              <a:r>
+                <a:rPr lang="en-US" sz="6300" dirty="0" err="1"/>
                 <a:t>trả</a:t>
               </a:r>
               <a:r>
-                <a:rPr lang="en-US" sz="2400" dirty="0"/>
-                <a:t> </a:t>
-              </a:r>
-              <a:r>
-                <a:rPr lang="en-US" sz="2400" dirty="0" err="1"/>
+                <a:rPr lang="en-US" sz="6300" dirty="0"/>
+                <a:t> </a:t>
+              </a:r>
+              <a:r>
+                <a:rPr lang="en-US" sz="6300" dirty="0" err="1"/>
                 <a:t>nợ</a:t>
               </a:r>
               <a:r>
-                <a:rPr lang="en-US" sz="2400" dirty="0"/>
-                <a:t> </a:t>
-              </a:r>
-              <a:r>
-                <a:rPr lang="en-US" sz="2400" dirty="0" err="1"/>
+                <a:rPr lang="en-US" sz="6300" dirty="0"/>
+                <a:t> </a:t>
+              </a:r>
+              <a:r>
+                <a:rPr lang="en-US" sz="6300" dirty="0" err="1"/>
                 <a:t>môn</a:t>
               </a:r>
               <a:r>
-                <a:rPr lang="en-US" sz="2400" dirty="0"/>
-                <a:t> </a:t>
-              </a:r>
-              <a:r>
-                <a:rPr lang="en-US" sz="2400" dirty="0" err="1"/>
+                <a:rPr lang="en-US" sz="6300" dirty="0"/>
+                <a:t> </a:t>
+              </a:r>
+              <a:r>
+                <a:rPr lang="en-US" sz="6300" dirty="0" err="1"/>
                 <a:t>trong</a:t>
               </a:r>
               <a:r>
-                <a:rPr lang="en-US" sz="2400" dirty="0"/>
-                <a:t> </a:t>
-              </a:r>
-              <a:r>
-                <a:rPr lang="en-US" sz="2400" dirty="0" err="1"/>
+                <a:rPr lang="en-US" sz="6300" dirty="0"/>
+                <a:t> </a:t>
+              </a:r>
+              <a:r>
+                <a:rPr lang="en-US" sz="6300" dirty="0" err="1"/>
                 <a:t>năm</a:t>
               </a:r>
               <a:r>
-                <a:rPr lang="en-US" sz="2400" dirty="0"/>
-                <a:t> </a:t>
-              </a:r>
-              <a:r>
-                <a:rPr lang="en-US" sz="2400" dirty="0" err="1"/>
+                <a:rPr lang="en-US" sz="6300" dirty="0"/>
+                <a:t> </a:t>
+              </a:r>
+              <a:r>
+                <a:rPr lang="en-US" sz="6300" dirty="0" err="1"/>
                 <a:t>học</a:t>
               </a:r>
               <a:r>
-                <a:rPr lang="en-US" sz="2400" dirty="0"/>
+                <a:rPr lang="en-US" sz="6300" dirty="0"/>
                 <a:t>, </a:t>
               </a:r>
               <a:r>
-                <a:rPr lang="en-US" sz="2400" dirty="0" err="1"/>
+                <a:rPr lang="en-US" sz="6300" dirty="0" err="1"/>
                 <a:t>thì</a:t>
               </a:r>
               <a:r>
-                <a:rPr lang="en-US" sz="2400" dirty="0"/>
-                <a:t> </a:t>
-              </a:r>
-              <a:r>
-                <a:rPr lang="en-US" sz="2400" dirty="0" err="1"/>
+                <a:rPr lang="en-US" sz="6300" dirty="0"/>
+                <a:t> </a:t>
+              </a:r>
+              <a:r>
+                <a:rPr lang="en-US" sz="6300" dirty="0" err="1"/>
                 <a:t>chỉ</a:t>
               </a:r>
               <a:r>
-                <a:rPr lang="en-US" sz="2400" dirty="0"/>
-                <a:t> </a:t>
-              </a:r>
-              <a:r>
-                <a:rPr lang="en-US" sz="2400" dirty="0" err="1"/>
+                <a:rPr lang="en-US" sz="6300" dirty="0"/>
+                <a:t> </a:t>
+              </a:r>
+              <a:r>
+                <a:rPr lang="en-US" sz="6300" dirty="0" err="1"/>
                 <a:t>tính</a:t>
               </a:r>
               <a:r>
-                <a:rPr lang="en-US" sz="2400" dirty="0"/>
-                <a:t> </a:t>
-              </a:r>
-              <a:r>
-                <a:rPr lang="en-US" sz="2400" dirty="0" err="1"/>
+                <a:rPr lang="en-US" sz="6300" dirty="0"/>
+                <a:t> </a:t>
+              </a:r>
+              <a:r>
+                <a:rPr lang="en-US" sz="6300" dirty="0" err="1"/>
                 <a:t>điểm</a:t>
               </a:r>
               <a:r>
-                <a:rPr lang="en-US" sz="2400" dirty="0"/>
-                <a:t> </a:t>
-              </a:r>
-              <a:r>
-                <a:rPr lang="en-US" sz="2400" dirty="0" err="1"/>
+                <a:rPr lang="en-US" sz="6300" dirty="0"/>
+                <a:t> </a:t>
+              </a:r>
+              <a:r>
+                <a:rPr lang="en-US" sz="6300" dirty="0" err="1"/>
                 <a:t>của</a:t>
               </a:r>
               <a:r>
-                <a:rPr lang="en-US" sz="2400" dirty="0"/>
-                <a:t> </a:t>
-              </a:r>
-              <a:r>
-                <a:rPr lang="en-US" sz="2400" dirty="0" err="1"/>
+                <a:rPr lang="en-US" sz="6300" dirty="0"/>
+                <a:t> </a:t>
+              </a:r>
+              <a:r>
+                <a:rPr lang="en-US" sz="6300" dirty="0" err="1"/>
                 <a:t>lần</a:t>
               </a:r>
               <a:r>
-                <a:rPr lang="en-US" sz="2400" dirty="0"/>
-                <a:t> </a:t>
-              </a:r>
-              <a:r>
-                <a:rPr lang="en-US" sz="2400" dirty="0" err="1"/>
+                <a:rPr lang="en-US" sz="6300" dirty="0"/>
+                <a:t> </a:t>
+              </a:r>
+              <a:r>
+                <a:rPr lang="en-US" sz="6300" dirty="0" err="1"/>
                 <a:t>học</a:t>
               </a:r>
               <a:r>
-                <a:rPr lang="en-US" sz="2400" dirty="0"/>
-                <a:t> </a:t>
-              </a:r>
-              <a:r>
-                <a:rPr lang="en-US" sz="2400" dirty="0" err="1"/>
+                <a:rPr lang="en-US" sz="6300" dirty="0"/>
+                <a:t> </a:t>
+              </a:r>
+              <a:r>
+                <a:rPr lang="en-US" sz="6300" dirty="0" err="1"/>
                 <a:t>trả</a:t>
               </a:r>
               <a:r>
-                <a:rPr lang="en-US" sz="2400" dirty="0"/>
-                <a:t> </a:t>
-              </a:r>
-              <a:r>
-                <a:rPr lang="en-US" sz="2400" dirty="0" err="1"/>
+                <a:rPr lang="en-US" sz="6300" dirty="0"/>
+                <a:t> </a:t>
+              </a:r>
+              <a:r>
+                <a:rPr lang="en-US" sz="6300" dirty="0" err="1"/>
                 <a:t>nợ</a:t>
               </a:r>
               <a:r>
-                <a:rPr lang="en-US" sz="2400" dirty="0"/>
-                <a:t> </a:t>
-              </a:r>
-              <a:r>
-                <a:rPr lang="en-US" sz="2400" dirty="0" err="1"/>
+                <a:rPr lang="en-US" sz="6300" dirty="0"/>
+                <a:t> </a:t>
+              </a:r>
+              <a:r>
+                <a:rPr lang="en-US" sz="6300" dirty="0" err="1"/>
                 <a:t>môn</a:t>
               </a:r>
               <a:r>
-                <a:rPr lang="en-US" sz="2400" dirty="0"/>
-                <a:t> </a:t>
-              </a:r>
-              <a:r>
-                <a:rPr lang="en-US" sz="2400" i="1" dirty="0"/>
+                <a:rPr lang="en-US" sz="6300" dirty="0"/>
+                <a:t> </a:t>
+              </a:r>
+              <a:r>
+                <a:rPr lang="en-US" sz="6300" i="1" dirty="0"/>
                 <a:t>(</a:t>
               </a:r>
               <a:r>
-                <a:rPr lang="en-US" sz="2400" i="1" dirty="0" err="1"/>
+                <a:rPr lang="en-US" sz="6300" i="1" dirty="0" err="1"/>
                 <a:t>nghĩa</a:t>
               </a:r>
               <a:r>
-                <a:rPr lang="en-US" sz="2400" i="1" dirty="0"/>
-                <a:t> </a:t>
-              </a:r>
-              <a:r>
-                <a:rPr lang="en-US" sz="2400" i="1" dirty="0" err="1"/>
+                <a:rPr lang="en-US" sz="6300" i="1" dirty="0"/>
+                <a:t> </a:t>
+              </a:r>
+              <a:r>
+                <a:rPr lang="en-US" sz="6300" i="1" dirty="0" err="1"/>
                 <a:t>là</a:t>
               </a:r>
               <a:r>
-                <a:rPr lang="en-US" sz="2400" i="1" dirty="0"/>
-                <a:t> </a:t>
-              </a:r>
-              <a:r>
-                <a:rPr lang="en-US" sz="2400" i="1" dirty="0" err="1"/>
+                <a:rPr lang="en-US" sz="6300" i="1" dirty="0"/>
+                <a:t> </a:t>
+              </a:r>
+              <a:r>
+                <a:rPr lang="en-US" sz="6300" i="1" dirty="0" err="1"/>
                 <a:t>lấy</a:t>
               </a:r>
               <a:r>
-                <a:rPr lang="en-US" sz="2400" i="1" dirty="0"/>
-                <a:t> </a:t>
-              </a:r>
-              <a:r>
-                <a:rPr lang="en-US" sz="2400" i="1" dirty="0" err="1"/>
+                <a:rPr lang="en-US" sz="6300" i="1" dirty="0"/>
+                <a:t> </a:t>
+              </a:r>
+              <a:r>
+                <a:rPr lang="en-US" sz="6300" i="1" dirty="0" err="1"/>
                 <a:t>lần</a:t>
               </a:r>
               <a:r>
-                <a:rPr lang="en-US" sz="2400" i="1" dirty="0"/>
-                <a:t> </a:t>
-              </a:r>
-              <a:r>
-                <a:rPr lang="en-US" sz="2400" i="1" dirty="0" err="1"/>
+                <a:rPr lang="en-US" sz="6300" i="1" dirty="0"/>
+                <a:t> </a:t>
+              </a:r>
+              <a:r>
+                <a:rPr lang="en-US" sz="6300" i="1" dirty="0" err="1"/>
                 <a:t>đạt</a:t>
               </a:r>
               <a:r>
-                <a:rPr lang="en-US" sz="2400" i="1" dirty="0"/>
-                <a:t> </a:t>
-              </a:r>
-              <a:r>
-                <a:rPr lang="en-US" sz="2400" i="1" dirty="0" err="1"/>
+                <a:rPr lang="en-US" sz="6300" i="1" dirty="0"/>
+                <a:t> </a:t>
+              </a:r>
+              <a:r>
+                <a:rPr lang="en-US" sz="6300" i="1" dirty="0" err="1"/>
                 <a:t>điểm</a:t>
               </a:r>
               <a:r>
-                <a:rPr lang="en-US" sz="2400" i="1" dirty="0"/>
-                <a:t> </a:t>
-              </a:r>
-              <a:r>
-                <a:rPr lang="en-US" sz="2400" i="1" dirty="0" err="1"/>
+                <a:rPr lang="en-US" sz="6300" i="1" dirty="0"/>
+                <a:t> </a:t>
+              </a:r>
+              <a:r>
+                <a:rPr lang="en-US" sz="6300" i="1" dirty="0" err="1"/>
                 <a:t>cao</a:t>
               </a:r>
               <a:r>
-                <a:rPr lang="en-US" sz="2400" i="1" dirty="0"/>
-                <a:t> </a:t>
-              </a:r>
-              <a:r>
-                <a:rPr lang="en-US" sz="2400" i="1" dirty="0" err="1"/>
+                <a:rPr lang="en-US" sz="6300" i="1" dirty="0"/>
+                <a:t> </a:t>
+              </a:r>
+              <a:r>
+                <a:rPr lang="en-US" sz="6300" i="1" dirty="0" err="1"/>
                 <a:t>nhất</a:t>
               </a:r>
               <a:r>
-                <a:rPr lang="en-US" sz="2400" i="1" dirty="0"/>
+                <a:rPr lang="en-US" sz="6300" i="1" dirty="0"/>
                 <a:t>)</a:t>
               </a:r>
               <a:r>
-                <a:rPr lang="en-US" sz="2400" dirty="0"/>
+                <a:rPr lang="en-US" sz="6300" dirty="0"/>
                 <a:t>.</a:t>
               </a:r>
             </a:p>
@@ -4547,40 +4517,10 @@
 </p:sld>
 </file>
 
-<file path=ppt/slides/slide3.xml><?xml version="1.0" encoding="utf-8"?>
-<p:sld xmlns:a="http://schemas.openxmlformats.org/drawingml/2006/main" xmlns:r="http://schemas.openxmlformats.org/officeDocument/2006/relationships" xmlns:p="http://schemas.openxmlformats.org/presentationml/2006/main">
-  <p:cSld>
-    <p:spTree>
-      <p:nvGrpSpPr>
-        <p:cNvPr id="1" name=""/>
-        <p:cNvGrpSpPr/>
-        <p:nvPr/>
-      </p:nvGrpSpPr>
-      <p:grpSpPr>
-        <a:xfrm>
-          <a:off x="0" y="0"/>
-          <a:ext cx="0" cy="0"/>
-          <a:chOff x="0" y="0"/>
-          <a:chExt cx="0" cy="0"/>
-        </a:xfrm>
-      </p:grpSpPr>
-    </p:spTree>
-    <p:extLst>
-      <p:ext uri="{BB962C8B-B14F-4D97-AF65-F5344CB8AC3E}">
-        <p14:creationId xmlns:p14="http://schemas.microsoft.com/office/powerpoint/2010/main" val="1690020587"/>
-      </p:ext>
-    </p:extLst>
-  </p:cSld>
-  <p:clrMapOvr>
-    <a:masterClrMapping/>
-  </p:clrMapOvr>
-</p:sld>
-</file>
-
 <file path=ppt/theme/theme1.xml><?xml version="1.0" encoding="utf-8"?>
 <a:theme xmlns:a="http://schemas.openxmlformats.org/drawingml/2006/main" name="Office Theme">
   <a:themeElements>
-    <a:clrScheme name="Office">
+    <a:clrScheme name="Office Theme">
       <a:dk1>
         <a:sysClr val="windowText" lastClr="000000"/>
       </a:dk1>
@@ -4618,7 +4558,7 @@
         <a:srgbClr val="954F72"/>
       </a:folHlink>
     </a:clrScheme>
-    <a:fontScheme name="Office">
+    <a:fontScheme name="Office Theme">
       <a:majorFont>
         <a:latin typeface="Calibri Light" panose="020F0302020204030204"/>
         <a:ea typeface=""/>
@@ -4653,23 +4593,6 @@
         <a:font script="Viet" typeface="Times New Roman"/>
         <a:font script="Uigh" typeface="Microsoft Uighur"/>
         <a:font script="Geor" typeface="Sylfaen"/>
-        <a:font script="Armn" typeface="Arial"/>
-        <a:font script="Bugi" typeface="Leelawadee UI"/>
-        <a:font script="Bopo" typeface="Microsoft JhengHei"/>
-        <a:font script="Java" typeface="Javanese Text"/>
-        <a:font script="Lisu" typeface="Segoe UI"/>
-        <a:font script="Mymr" typeface="Myanmar Text"/>
-        <a:font script="Nkoo" typeface="Ebrima"/>
-        <a:font script="Olck" typeface="Nirmala UI"/>
-        <a:font script="Osma" typeface="Ebrima"/>
-        <a:font script="Phag" typeface="Phagspa"/>
-        <a:font script="Syrn" typeface="Estrangelo Edessa"/>
-        <a:font script="Syrj" typeface="Estrangelo Edessa"/>
-        <a:font script="Syre" typeface="Estrangelo Edessa"/>
-        <a:font script="Sora" typeface="Nirmala UI"/>
-        <a:font script="Tale" typeface="Microsoft Tai Le"/>
-        <a:font script="Talu" typeface="Microsoft New Tai Lue"/>
-        <a:font script="Tfng" typeface="Ebrima"/>
       </a:majorFont>
       <a:minorFont>
         <a:latin typeface="Calibri" panose="020F0502020204030204"/>
@@ -4705,26 +4628,9 @@
         <a:font script="Viet" typeface="Arial"/>
         <a:font script="Uigh" typeface="Microsoft Uighur"/>
         <a:font script="Geor" typeface="Sylfaen"/>
-        <a:font script="Armn" typeface="Arial"/>
-        <a:font script="Bugi" typeface="Leelawadee UI"/>
-        <a:font script="Bopo" typeface="Microsoft JhengHei"/>
-        <a:font script="Java" typeface="Javanese Text"/>
-        <a:font script="Lisu" typeface="Segoe UI"/>
-        <a:font script="Mymr" typeface="Myanmar Text"/>
-        <a:font script="Nkoo" typeface="Ebrima"/>
-        <a:font script="Olck" typeface="Nirmala UI"/>
-        <a:font script="Osma" typeface="Ebrima"/>
-        <a:font script="Phag" typeface="Phagspa"/>
-        <a:font script="Syrn" typeface="Estrangelo Edessa"/>
-        <a:font script="Syrj" typeface="Estrangelo Edessa"/>
-        <a:font script="Syre" typeface="Estrangelo Edessa"/>
-        <a:font script="Sora" typeface="Nirmala UI"/>
-        <a:font script="Tale" typeface="Microsoft Tai Le"/>
-        <a:font script="Talu" typeface="Microsoft New Tai Lue"/>
-        <a:font script="Tfng" typeface="Ebrima"/>
       </a:minorFont>
     </a:fontScheme>
-    <a:fmtScheme name="Office">
+    <a:fmtScheme name="Office Theme">
       <a:fillStyleLst>
         <a:solidFill>
           <a:schemeClr val="phClr"/>

</xml_diff>